<commit_message>
Remove duplicate EventCenter in diagrams and update project portfolio
</commit_message>
<xml_diff>
--- a/docs/diagrams/ModuleDatabaseManagementDiagrams.pptx
+++ b/docs/diagrams/ModuleDatabaseManagementDiagrams.pptx
@@ -3227,7 +3227,7 @@
         <p:spPr>
           <a:xfrm>
             <a:off x="3233520" y="2997360"/>
-            <a:ext cx="2735640" cy="344880"/>
+            <a:ext cx="2735280" cy="344520"/>
           </a:xfrm>
           <a:prstGeom prst="rect">
             <a:avLst/>
@@ -3322,7 +3322,7 @@
         <p:spPr>
           <a:xfrm>
             <a:off x="4509360" y="2677680"/>
-            <a:ext cx="211680" cy="154440"/>
+            <a:ext cx="211320" cy="154080"/>
           </a:xfrm>
           <a:prstGeom prst="triangle">
             <a:avLst>
@@ -3360,7 +3360,7 @@
         <p:spPr>
           <a:xfrm>
             <a:off x="4020480" y="2307600"/>
-            <a:ext cx="1190160" cy="344880"/>
+            <a:ext cx="1189800" cy="344520"/>
           </a:xfrm>
           <a:prstGeom prst="rect">
             <a:avLst/>
@@ -3419,7 +3419,7 @@
         <p:spPr>
           <a:xfrm>
             <a:off x="4141800" y="3738960"/>
-            <a:ext cx="942840" cy="344880"/>
+            <a:ext cx="942480" cy="344520"/>
           </a:xfrm>
           <a:prstGeom prst="rect">
             <a:avLst/>
@@ -3478,7 +3478,7 @@
         <p:spPr>
           <a:xfrm>
             <a:off x="4540680" y="3372480"/>
-            <a:ext cx="145080" cy="185040"/>
+            <a:ext cx="144720" cy="184680"/>
           </a:xfrm>
           <a:prstGeom prst="diamond">
             <a:avLst/>
@@ -3550,7 +3550,7 @@
         <p:spPr>
           <a:xfrm>
             <a:off x="4399560" y="3537720"/>
-            <a:ext cx="217800" cy="302040"/>
+            <a:ext cx="217440" cy="301680"/>
           </a:xfrm>
           <a:prstGeom prst="rect">
             <a:avLst/>
@@ -3648,7 +3648,7 @@
         <p:spPr>
           <a:xfrm>
             <a:off x="1631880" y="1188720"/>
-            <a:ext cx="5682960" cy="4318200"/>
+            <a:ext cx="5682600" cy="4317840"/>
           </a:xfrm>
           <a:prstGeom prst="roundRect">
             <a:avLst>
@@ -3717,7 +3717,7 @@
         <p:spPr>
           <a:xfrm>
             <a:off x="1734480" y="1904400"/>
-            <a:ext cx="1089720" cy="344520"/>
+            <a:ext cx="1089360" cy="344160"/>
           </a:xfrm>
           <a:prstGeom prst="rect">
             <a:avLst/>
@@ -3821,7 +3821,7 @@
         <p:spPr>
           <a:xfrm>
             <a:off x="2226600" y="2618640"/>
-            <a:ext cx="112320" cy="2889360"/>
+            <a:ext cx="111960" cy="2889000"/>
           </a:xfrm>
           <a:prstGeom prst="rect">
             <a:avLst/>
@@ -3865,7 +3865,7 @@
         <p:spPr>
           <a:xfrm>
             <a:off x="3158280" y="1787040"/>
-            <a:ext cx="912600" cy="465480"/>
+            <a:ext cx="912240" cy="465120"/>
           </a:xfrm>
           <a:prstGeom prst="rect">
             <a:avLst/>
@@ -3980,7 +3980,7 @@
         <p:spPr>
           <a:xfrm>
             <a:off x="3564000" y="2729880"/>
-            <a:ext cx="129600" cy="1127160"/>
+            <a:ext cx="129240" cy="1126800"/>
           </a:xfrm>
           <a:prstGeom prst="rect">
             <a:avLst/>
@@ -4024,7 +4024,7 @@
         <p:spPr>
           <a:xfrm>
             <a:off x="5766840" y="2845080"/>
-            <a:ext cx="818280" cy="459360"/>
+            <a:ext cx="817920" cy="459000"/>
           </a:xfrm>
           <a:prstGeom prst="rect">
             <a:avLst/>
@@ -4158,7 +4158,7 @@
         <p:spPr>
           <a:xfrm>
             <a:off x="6123240" y="3310560"/>
-            <a:ext cx="112320" cy="248760"/>
+            <a:ext cx="111960" cy="248400"/>
           </a:xfrm>
           <a:prstGeom prst="rect">
             <a:avLst/>
@@ -4202,7 +4202,7 @@
         <p:spPr>
           <a:xfrm>
             <a:off x="1386360" y="2622240"/>
-            <a:ext cx="838080" cy="360"/>
+            <a:ext cx="837720" cy="360"/>
           </a:xfrm>
           <a:custGeom>
             <a:avLst/>
@@ -4250,8 +4250,8 @@
         </p:nvSpPr>
         <p:spPr>
           <a:xfrm flipV="1">
-            <a:off x="2340720" y="2725560"/>
-            <a:ext cx="1195560" cy="360"/>
+            <a:off x="2340720" y="2724840"/>
+            <a:ext cx="1195200" cy="360"/>
           </a:xfrm>
           <a:custGeom>
             <a:avLst/>
@@ -4299,8 +4299,8 @@
         </p:nvSpPr>
         <p:spPr>
           <a:xfrm flipV="1">
-            <a:off x="5009040" y="3306600"/>
-            <a:ext cx="758880" cy="360"/>
+            <a:off x="5009040" y="3305880"/>
+            <a:ext cx="758520" cy="360"/>
           </a:xfrm>
           <a:custGeom>
             <a:avLst/>
@@ -4349,7 +4349,7 @@
         <p:spPr>
           <a:xfrm>
             <a:off x="4124160" y="4092840"/>
-            <a:ext cx="639720" cy="211680"/>
+            <a:ext cx="639360" cy="211320"/>
           </a:xfrm>
           <a:prstGeom prst="rect">
             <a:avLst/>
@@ -4398,7 +4398,7 @@
         <p:spPr>
           <a:xfrm>
             <a:off x="5043960" y="3532320"/>
-            <a:ext cx="1117800" cy="360"/>
+            <a:ext cx="1117440" cy="360"/>
           </a:xfrm>
           <a:custGeom>
             <a:avLst/>
@@ -4450,7 +4450,7 @@
         <p:spPr>
           <a:xfrm flipV="1">
             <a:off x="2353320" y="3848760"/>
-            <a:ext cx="1195560" cy="3240"/>
+            <a:ext cx="1195200" cy="2880"/>
           </a:xfrm>
           <a:custGeom>
             <a:avLst/>
@@ -4502,7 +4502,7 @@
         <p:spPr>
           <a:xfrm>
             <a:off x="7300080" y="1969920"/>
-            <a:ext cx="771120" cy="344520"/>
+            <a:ext cx="770760" cy="344160"/>
           </a:xfrm>
           <a:prstGeom prst="rect">
             <a:avLst/>
@@ -4569,7 +4569,7 @@
         <p:spPr>
           <a:xfrm>
             <a:off x="2340720" y="4076280"/>
-            <a:ext cx="3780720" cy="360"/>
+            <a:ext cx="3780360" cy="360"/>
           </a:xfrm>
           <a:custGeom>
             <a:avLst/>
@@ -4618,7 +4618,7 @@
         <p:spPr>
           <a:xfrm>
             <a:off x="6116040" y="3661920"/>
-            <a:ext cx="119160" cy="1755720"/>
+            <a:ext cx="118800" cy="1755360"/>
           </a:xfrm>
           <a:prstGeom prst="rect">
             <a:avLst/>
@@ -4699,7 +4699,7 @@
         <p:spPr>
           <a:xfrm>
             <a:off x="7629480" y="4241160"/>
-            <a:ext cx="112320" cy="219600"/>
+            <a:ext cx="111960" cy="219240"/>
           </a:xfrm>
           <a:prstGeom prst="rect">
             <a:avLst/>
@@ -4743,7 +4743,7 @@
         <p:spPr>
           <a:xfrm>
             <a:off x="6238800" y="4516200"/>
-            <a:ext cx="1375200" cy="360"/>
+            <a:ext cx="1374840" cy="360"/>
           </a:xfrm>
           <a:custGeom>
             <a:avLst/>
@@ -4792,7 +4792,7 @@
         <p:spPr>
           <a:xfrm>
             <a:off x="2340720" y="5418000"/>
-            <a:ext cx="3787200" cy="360"/>
+            <a:ext cx="3786840" cy="360"/>
           </a:xfrm>
           <a:custGeom>
             <a:avLst/>
@@ -4844,7 +4844,7 @@
         <p:spPr>
           <a:xfrm>
             <a:off x="6264000" y="4359960"/>
-            <a:ext cx="1293120" cy="158400"/>
+            <a:ext cx="1292760" cy="158040"/>
           </a:xfrm>
           <a:prstGeom prst="rect">
             <a:avLst/>
@@ -4893,7 +4893,7 @@
         <p:spPr>
           <a:xfrm>
             <a:off x="2364480" y="2744640"/>
-            <a:ext cx="1066680" cy="728640"/>
+            <a:ext cx="1066320" cy="728280"/>
           </a:xfrm>
           <a:prstGeom prst="rect">
             <a:avLst/>
@@ -4984,7 +4984,7 @@
         <p:spPr>
           <a:xfrm>
             <a:off x="4356000" y="5187240"/>
-            <a:ext cx="464040" cy="211680"/>
+            <a:ext cx="463680" cy="211320"/>
           </a:xfrm>
           <a:prstGeom prst="rect">
             <a:avLst/>
@@ -5033,7 +5033,7 @@
         <p:spPr>
           <a:xfrm>
             <a:off x="1550880" y="5146200"/>
-            <a:ext cx="569520" cy="211680"/>
+            <a:ext cx="569160" cy="211320"/>
           </a:xfrm>
           <a:prstGeom prst="rect">
             <a:avLst/>
@@ -5082,7 +5082,7 @@
         <p:spPr>
           <a:xfrm>
             <a:off x="6365880" y="4914000"/>
-            <a:ext cx="879120" cy="335880"/>
+            <a:ext cx="878760" cy="335520"/>
           </a:xfrm>
           <a:prstGeom prst="rect">
             <a:avLst/>
@@ -5149,7 +5149,7 @@
         <p:spPr>
           <a:xfrm>
             <a:off x="6749640" y="5268600"/>
-            <a:ext cx="112320" cy="91440"/>
+            <a:ext cx="111960" cy="91080"/>
           </a:xfrm>
           <a:prstGeom prst="rect">
             <a:avLst/>
@@ -5193,7 +5193,7 @@
         <p:spPr>
           <a:xfrm>
             <a:off x="6249600" y="5354280"/>
-            <a:ext cx="497880" cy="360"/>
+            <a:ext cx="497520" cy="360"/>
           </a:xfrm>
           <a:custGeom>
             <a:avLst/>
@@ -5245,7 +5245,7 @@
         <p:spPr>
           <a:xfrm>
             <a:off x="4274640" y="2455920"/>
-            <a:ext cx="1394280" cy="469800"/>
+            <a:ext cx="1393920" cy="469440"/>
           </a:xfrm>
           <a:prstGeom prst="rect">
             <a:avLst/>
@@ -5332,7 +5332,7 @@
         <p:spPr>
           <a:xfrm>
             <a:off x="3697560" y="3265200"/>
-            <a:ext cx="1196280" cy="360"/>
+            <a:ext cx="1195920" cy="360"/>
           </a:xfrm>
           <a:custGeom>
             <a:avLst/>
@@ -5381,7 +5381,7 @@
         <p:spPr>
           <a:xfrm>
             <a:off x="4895640" y="2960640"/>
-            <a:ext cx="152640" cy="120960"/>
+            <a:ext cx="152280" cy="120600"/>
           </a:xfrm>
           <a:prstGeom prst="rect">
             <a:avLst/>
@@ -5462,7 +5462,7 @@
         <p:spPr>
           <a:xfrm>
             <a:off x="4895640" y="3265200"/>
-            <a:ext cx="152640" cy="531360"/>
+            <a:ext cx="152280" cy="531000"/>
           </a:xfrm>
           <a:prstGeom prst="rect">
             <a:avLst/>
@@ -5506,7 +5506,7 @@
         <p:spPr>
           <a:xfrm>
             <a:off x="3725280" y="3792960"/>
-            <a:ext cx="1248480" cy="360"/>
+            <a:ext cx="1248120" cy="360"/>
           </a:xfrm>
           <a:custGeom>
             <a:avLst/>
@@ -5558,7 +5558,7 @@
         <p:spPr>
           <a:xfrm>
             <a:off x="6244200" y="5055840"/>
-            <a:ext cx="119880" cy="360"/>
+            <a:ext cx="119520" cy="360"/>
           </a:xfrm>
           <a:custGeom>
             <a:avLst/>
@@ -5607,7 +5607,7 @@
         <p:spPr>
           <a:xfrm>
             <a:off x="3660120" y="2780640"/>
-            <a:ext cx="613080" cy="360"/>
+            <a:ext cx="612720" cy="360"/>
           </a:xfrm>
           <a:custGeom>
             <a:avLst/>
@@ -5656,7 +5656,7 @@
         <p:spPr>
           <a:xfrm>
             <a:off x="3695400" y="3083760"/>
-            <a:ext cx="1198440" cy="360"/>
+            <a:ext cx="1198080" cy="360"/>
           </a:xfrm>
           <a:custGeom>
             <a:avLst/>
@@ -5708,7 +5708,7 @@
         <p:spPr>
           <a:xfrm>
             <a:off x="3618360" y="3313080"/>
-            <a:ext cx="1248840" cy="135720"/>
+            <a:ext cx="1248480" cy="135360"/>
           </a:xfrm>
           <a:prstGeom prst="rect">
             <a:avLst/>
@@ -5761,7 +5761,7 @@
         <p:spPr>
           <a:xfrm>
             <a:off x="4887720" y="3873600"/>
-            <a:ext cx="182880" cy="244080"/>
+            <a:ext cx="182520" cy="243720"/>
           </a:xfrm>
           <a:prstGeom prst="rect">
             <a:avLst/>
@@ -5780,7 +5780,7 @@
         <p:spPr>
           <a:xfrm>
             <a:off x="6244200" y="4852080"/>
-            <a:ext cx="1375200" cy="360"/>
+            <a:ext cx="1374840" cy="360"/>
           </a:xfrm>
           <a:custGeom>
             <a:avLst/>
@@ -5829,7 +5829,7 @@
         <p:spPr>
           <a:xfrm>
             <a:off x="6309360" y="4694400"/>
-            <a:ext cx="1223640" cy="135720"/>
+            <a:ext cx="1223280" cy="135360"/>
           </a:xfrm>
           <a:prstGeom prst="rect">
             <a:avLst/>
@@ -5878,7 +5878,7 @@
         <p:spPr>
           <a:xfrm>
             <a:off x="6238800" y="4264560"/>
-            <a:ext cx="1375200" cy="360"/>
+            <a:ext cx="1374840" cy="360"/>
           </a:xfrm>
           <a:custGeom>
             <a:avLst/>
@@ -5927,7 +5927,7 @@
         <p:spPr>
           <a:xfrm>
             <a:off x="6021720" y="4071960"/>
-            <a:ext cx="1293120" cy="158400"/>
+            <a:ext cx="1292760" cy="158040"/>
           </a:xfrm>
           <a:prstGeom prst="rect">
             <a:avLst/>
@@ -5976,7 +5976,7 @@
         <p:spPr>
           <a:xfrm>
             <a:off x="7629480" y="4827240"/>
-            <a:ext cx="112320" cy="219600"/>
+            <a:ext cx="111960" cy="219240"/>
           </a:xfrm>
           <a:prstGeom prst="rect">
             <a:avLst/>
@@ -6020,7 +6020,7 @@
         <p:spPr>
           <a:xfrm>
             <a:off x="7629480" y="4503240"/>
-            <a:ext cx="112320" cy="219600"/>
+            <a:ext cx="111960" cy="219240"/>
           </a:xfrm>
           <a:prstGeom prst="rect">
             <a:avLst/>
@@ -6064,7 +6064,7 @@
         <p:spPr>
           <a:xfrm flipV="1">
             <a:off x="1021320" y="5506560"/>
-            <a:ext cx="1195560" cy="3240"/>
+            <a:ext cx="1195200" cy="2880"/>
           </a:xfrm>
           <a:custGeom>
             <a:avLst/>
@@ -6165,7 +6165,7 @@
         <p:spPr>
           <a:xfrm>
             <a:off x="606600" y="2606760"/>
-            <a:ext cx="682200" cy="215280"/>
+            <a:ext cx="681840" cy="214920"/>
           </a:xfrm>
           <a:prstGeom prst="rect">
             <a:avLst/>
@@ -6269,7 +6269,7 @@
         <p:spPr>
           <a:xfrm>
             <a:off x="903240" y="3002760"/>
-            <a:ext cx="93600" cy="960120"/>
+            <a:ext cx="93240" cy="959760"/>
           </a:xfrm>
           <a:prstGeom prst="rect">
             <a:avLst/>
@@ -6313,9 +6313,9 @@
         <p:grpSpPr>
           <a:xfrm>
             <a:off x="6480" y="2560320"/>
-            <a:ext cx="202320" cy="357120"/>
+            <a:ext cx="202320" cy="356760"/>
             <a:chOff x="6480" y="2560320"/>
-            <a:chExt cx="202320" cy="357120"/>
+            <a:chExt cx="202320" cy="356760"/>
           </a:xfrm>
         </p:grpSpPr>
         <p:sp>
@@ -6327,7 +6327,7 @@
           <p:spPr>
             <a:xfrm>
               <a:off x="62640" y="2560320"/>
-              <a:ext cx="88560" cy="88560"/>
+              <a:ext cx="88200" cy="88200"/>
             </a:xfrm>
             <a:prstGeom prst="flowChartConnector">
               <a:avLst/>
@@ -6407,7 +6407,7 @@
           <p:spPr>
             <a:xfrm>
               <a:off x="32760" y="2805840"/>
-              <a:ext cx="148320" cy="111600"/>
+              <a:ext cx="147960" cy="111240"/>
             </a:xfrm>
             <a:custGeom>
               <a:avLst/>
@@ -6500,7 +6500,7 @@
         <p:spPr>
           <a:xfrm>
             <a:off x="1734840" y="2609280"/>
-            <a:ext cx="682560" cy="215280"/>
+            <a:ext cx="682200" cy="214920"/>
           </a:xfrm>
           <a:prstGeom prst="rect">
             <a:avLst/>
@@ -6604,7 +6604,7 @@
         <p:spPr>
           <a:xfrm>
             <a:off x="2031840" y="3122640"/>
-            <a:ext cx="88560" cy="777240"/>
+            <a:ext cx="88200" cy="776880"/>
           </a:xfrm>
           <a:prstGeom prst="rect">
             <a:avLst/>
@@ -6648,7 +6648,7 @@
         <p:spPr>
           <a:xfrm>
             <a:off x="3236040" y="2606760"/>
-            <a:ext cx="682560" cy="215280"/>
+            <a:ext cx="682200" cy="214920"/>
           </a:xfrm>
           <a:prstGeom prst="rect">
             <a:avLst/>
@@ -6752,7 +6752,7 @@
         <p:spPr>
           <a:xfrm>
             <a:off x="3533040" y="3164400"/>
-            <a:ext cx="87120" cy="685800"/>
+            <a:ext cx="86760" cy="685440"/>
           </a:xfrm>
           <a:prstGeom prst="rect">
             <a:avLst/>
@@ -6796,7 +6796,7 @@
         <p:spPr>
           <a:xfrm>
             <a:off x="203040" y="3019680"/>
-            <a:ext cx="698760" cy="360"/>
+            <a:ext cx="698400" cy="360"/>
           </a:xfrm>
           <a:custGeom>
             <a:avLst/>
@@ -6845,7 +6845,7 @@
         <p:spPr>
           <a:xfrm>
             <a:off x="149400" y="3068280"/>
-            <a:ext cx="743760" cy="284760"/>
+            <a:ext cx="743400" cy="284400"/>
           </a:xfrm>
           <a:prstGeom prst="rect">
             <a:avLst/>
@@ -6914,7 +6914,7 @@
         <p:spPr>
           <a:xfrm>
             <a:off x="943560" y="3123000"/>
-            <a:ext cx="1081440" cy="360"/>
+            <a:ext cx="1081080" cy="360"/>
           </a:xfrm>
           <a:custGeom>
             <a:avLst/>
@@ -6963,7 +6963,7 @@
         <p:spPr>
           <a:xfrm>
             <a:off x="1265760" y="3135600"/>
-            <a:ext cx="889560" cy="93960"/>
+            <a:ext cx="889200" cy="93600"/>
           </a:xfrm>
           <a:prstGeom prst="rect">
             <a:avLst/>
@@ -7012,7 +7012,7 @@
         <p:spPr>
           <a:xfrm>
             <a:off x="2086920" y="3179520"/>
-            <a:ext cx="1442880" cy="360"/>
+            <a:ext cx="1442520" cy="360"/>
           </a:xfrm>
           <a:custGeom>
             <a:avLst/>
@@ -7061,7 +7061,7 @@
         <p:spPr>
           <a:xfrm>
             <a:off x="2198880" y="3213720"/>
-            <a:ext cx="1271520" cy="75240"/>
+            <a:ext cx="1271160" cy="74880"/>
           </a:xfrm>
           <a:prstGeom prst="rect">
             <a:avLst/>
@@ -7120,7 +7120,7 @@
         <p:spPr>
           <a:xfrm>
             <a:off x="3709440" y="3317760"/>
-            <a:ext cx="1523520" cy="94320"/>
+            <a:ext cx="1523160" cy="93960"/>
           </a:xfrm>
           <a:prstGeom prst="rect">
             <a:avLst/>
@@ -7169,7 +7169,7 @@
         <p:spPr>
           <a:xfrm>
             <a:off x="2121840" y="3841560"/>
-            <a:ext cx="1442880" cy="360"/>
+            <a:ext cx="1442520" cy="360"/>
           </a:xfrm>
           <a:custGeom>
             <a:avLst/>
@@ -7221,7 +7221,7 @@
         <p:spPr>
           <a:xfrm>
             <a:off x="983880" y="3907440"/>
-            <a:ext cx="1022400" cy="360"/>
+            <a:ext cx="1022040" cy="360"/>
           </a:xfrm>
           <a:custGeom>
             <a:avLst/>
@@ -7273,7 +7273,7 @@
         <p:spPr>
           <a:xfrm>
             <a:off x="155520" y="3974040"/>
-            <a:ext cx="746280" cy="360"/>
+            <a:ext cx="745920" cy="360"/>
           </a:xfrm>
           <a:custGeom>
             <a:avLst/>
@@ -7325,7 +7325,7 @@
         <p:spPr>
           <a:xfrm>
             <a:off x="4831920" y="2596320"/>
-            <a:ext cx="988200" cy="215280"/>
+            <a:ext cx="987840" cy="214920"/>
           </a:xfrm>
           <a:prstGeom prst="rect">
             <a:avLst/>
@@ -7435,7 +7435,7 @@
         <p:spPr>
           <a:xfrm>
             <a:off x="5254920" y="3266280"/>
-            <a:ext cx="87120" cy="493920"/>
+            <a:ext cx="86760" cy="493560"/>
           </a:xfrm>
           <a:prstGeom prst="rect">
             <a:avLst/>
@@ -7483,7 +7483,7 @@
         <p:spPr>
           <a:xfrm>
             <a:off x="3628080" y="3299040"/>
-            <a:ext cx="1604880" cy="360"/>
+            <a:ext cx="1604520" cy="360"/>
           </a:xfrm>
           <a:custGeom>
             <a:avLst/>
@@ -7532,7 +7532,7 @@
         <p:spPr>
           <a:xfrm>
             <a:off x="3628080" y="3774960"/>
-            <a:ext cx="1636920" cy="360"/>
+            <a:ext cx="1636560" cy="360"/>
           </a:xfrm>
           <a:custGeom>
             <a:avLst/>
@@ -7622,8 +7622,8 @@
         </p:nvSpPr>
         <p:spPr>
           <a:xfrm>
-            <a:off x="8364960" y="2743200"/>
-            <a:ext cx="682200" cy="215280"/>
+            <a:off x="6724800" y="2834640"/>
+            <a:ext cx="681840" cy="214920"/>
           </a:xfrm>
           <a:prstGeom prst="rect">
             <a:avLst/>
@@ -7693,7 +7693,7 @@
         </p:nvSpPr>
         <p:spPr>
           <a:xfrm>
-            <a:off x="8651160" y="2981520"/>
+            <a:off x="7011000" y="3072960"/>
             <a:ext cx="360" cy="1077480"/>
           </a:xfrm>
           <a:prstGeom prst="line">
@@ -7732,8 +7732,8 @@
         </p:nvSpPr>
         <p:spPr>
           <a:xfrm>
-            <a:off x="8606520" y="3415320"/>
-            <a:ext cx="76320" cy="178200"/>
+            <a:off x="6966360" y="3506760"/>
+            <a:ext cx="75960" cy="177840"/>
           </a:xfrm>
           <a:prstGeom prst="rect">
             <a:avLst/>
@@ -7779,58 +7779,9 @@
           <p:nvPr/>
         </p:nvSpPr>
         <p:spPr>
-          <a:xfrm>
-            <a:off x="5386320" y="3249360"/>
-            <a:ext cx="1565280" cy="93960"/>
-          </a:xfrm>
-          <a:prstGeom prst="rect">
-            <a:avLst/>
-          </a:prstGeom>
-          <a:noFill/>
-          <a:ln>
-            <a:noFill/>
-          </a:ln>
-        </p:spPr>
-        <p:style>
-          <a:lnRef idx="0"/>
-          <a:fillRef idx="0"/>
-          <a:effectRef idx="0"/>
-          <a:fontRef idx="minor"/>
-        </p:style>
-        <p:txBody>
-          <a:bodyPr lIns="0" rIns="0" tIns="0" bIns="0"/>
-          <a:p>
-            <a:pPr>
-              <a:lnSpc>
-                <a:spcPct val="100000"/>
-              </a:lnSpc>
-            </a:pPr>
-            <a:r>
-              <a:rPr b="0" lang="en-US" sz="700" spc="-1" strike="noStrike">
-                <a:solidFill>
-                  <a:srgbClr val="31859c"/>
-                </a:solidFill>
-                <a:latin typeface="Calibri"/>
-                <a:ea typeface="DejaVu Sans"/>
-              </a:rPr>
-              <a:t>raise(ModuleListChangedEvent)</a:t>
-            </a:r>
-            <a:endParaRPr b="0" lang="en-US" sz="700" spc="-1" strike="noStrike">
-              <a:latin typeface="Arial"/>
-            </a:endParaRPr>
-          </a:p>
-        </p:txBody>
-      </p:sp>
-      <p:sp>
-        <p:nvSpPr>
-          <p:cNvPr id="166" name="CustomShape 35"/>
-          <p:cNvSpPr/>
-          <p:nvPr/>
-        </p:nvSpPr>
-        <p:spPr>
           <a:xfrm flipH="1">
-            <a:off x="6994800" y="3584160"/>
-            <a:ext cx="1599120" cy="360"/>
+            <a:off x="5353920" y="3675600"/>
+            <a:ext cx="1598760" cy="360"/>
           </a:xfrm>
           <a:custGeom>
             <a:avLst/>
@@ -7877,172 +7828,14 @@
       </p:sp>
       <p:sp>
         <p:nvSpPr>
-          <p:cNvPr id="167" name="CustomShape 36"/>
-          <p:cNvSpPr/>
-          <p:nvPr/>
-        </p:nvSpPr>
-        <p:spPr>
-          <a:xfrm>
-            <a:off x="6464160" y="2754000"/>
-            <a:ext cx="1004760" cy="214920"/>
-          </a:xfrm>
-          <a:prstGeom prst="rect">
-            <a:avLst/>
-          </a:prstGeom>
-          <a:solidFill>
-            <a:schemeClr val="accent5">
-              <a:lumMod val="75000"/>
-            </a:schemeClr>
-          </a:solidFill>
-          <a:ln w="19080">
-            <a:solidFill>
-              <a:schemeClr val="accent5">
-                <a:lumMod val="75000"/>
-              </a:schemeClr>
-            </a:solidFill>
-            <a:round/>
-          </a:ln>
-          <a:effectLst>
-            <a:outerShdw blurRad="40000" dir="5400000" dist="20000" rotWithShape="0">
-              <a:srgbClr val="000000">
-                <a:alpha val="38000"/>
-              </a:srgbClr>
-            </a:outerShdw>
-          </a:effectLst>
-        </p:spPr>
-        <p:style>
-          <a:lnRef idx="1">
-            <a:schemeClr val="accent2"/>
-          </a:lnRef>
-          <a:fillRef idx="2">
-            <a:schemeClr val="accent2"/>
-          </a:fillRef>
-          <a:effectRef idx="1">
-            <a:schemeClr val="accent2"/>
-          </a:effectRef>
-          <a:fontRef idx="minor"/>
-        </p:style>
-        <p:txBody>
-          <a:bodyPr lIns="90000" rIns="90000" tIns="45000" bIns="45000" anchor="ctr"/>
-          <a:p>
-            <a:pPr algn="ctr">
-              <a:lnSpc>
-                <a:spcPct val="100000"/>
-              </a:lnSpc>
-            </a:pPr>
-            <a:r>
-              <a:rPr b="0" lang="en-US" sz="900" spc="-1" strike="noStrike">
-                <a:solidFill>
-                  <a:srgbClr val="ffffff"/>
-                </a:solidFill>
-                <a:latin typeface="Calibri"/>
-                <a:ea typeface="DejaVu Sans"/>
-              </a:rPr>
-              <a:t>:EventsCenter</a:t>
-            </a:r>
-            <a:endParaRPr b="0" lang="en-US" sz="900" spc="-1" strike="noStrike">
-              <a:latin typeface="Arial"/>
-            </a:endParaRPr>
-          </a:p>
-        </p:txBody>
-      </p:sp>
-      <p:sp>
-        <p:nvSpPr>
-          <p:cNvPr id="168" name="Line 37"/>
-          <p:cNvSpPr/>
-          <p:nvPr/>
-        </p:nvSpPr>
-        <p:spPr>
-          <a:xfrm>
-            <a:off x="6952680" y="2974320"/>
-            <a:ext cx="360" cy="1077840"/>
-          </a:xfrm>
-          <a:prstGeom prst="line">
-            <a:avLst/>
-          </a:prstGeom>
-          <a:ln w="19080">
-            <a:solidFill>
-              <a:schemeClr val="accent5">
-                <a:lumMod val="75000"/>
-              </a:schemeClr>
-            </a:solidFill>
-            <a:custDash>
-              <a:ds d="300000" sp="100000"/>
-            </a:custDash>
-            <a:round/>
-          </a:ln>
-        </p:spPr>
-        <p:style>
-          <a:lnRef idx="1">
-            <a:schemeClr val="accent1"/>
-          </a:lnRef>
-          <a:fillRef idx="2">
-            <a:schemeClr val="accent1"/>
-          </a:fillRef>
-          <a:effectRef idx="1">
-            <a:schemeClr val="accent1"/>
-          </a:effectRef>
-          <a:fontRef idx="minor"/>
-        </p:style>
-      </p:sp>
-      <p:sp>
-        <p:nvSpPr>
-          <p:cNvPr id="169" name="CustomShape 38"/>
-          <p:cNvSpPr/>
-          <p:nvPr/>
-        </p:nvSpPr>
-        <p:spPr>
-          <a:xfrm>
-            <a:off x="6907680" y="3383280"/>
-            <a:ext cx="91440" cy="283320"/>
-          </a:xfrm>
-          <a:prstGeom prst="rect">
-            <a:avLst/>
-          </a:prstGeom>
-          <a:solidFill>
-            <a:schemeClr val="accent5">
-              <a:lumMod val="75000"/>
-            </a:schemeClr>
-          </a:solidFill>
-          <a:ln>
-            <a:solidFill>
-              <a:schemeClr val="accent5">
-                <a:lumMod val="75000"/>
-              </a:schemeClr>
-            </a:solidFill>
-            <a:round/>
-          </a:ln>
-          <a:effectLst>
-            <a:outerShdw blurRad="40000" dir="5400000" dist="20000" rotWithShape="0">
-              <a:srgbClr val="000000">
-                <a:alpha val="38000"/>
-              </a:srgbClr>
-            </a:outerShdw>
-          </a:effectLst>
-        </p:spPr>
-        <p:style>
-          <a:lnRef idx="1">
-            <a:schemeClr val="accent3"/>
-          </a:lnRef>
-          <a:fillRef idx="2">
-            <a:schemeClr val="accent3"/>
-          </a:fillRef>
-          <a:effectRef idx="1">
-            <a:schemeClr val="accent3"/>
-          </a:effectRef>
-          <a:fontRef idx="minor"/>
-        </p:style>
-      </p:sp>
-      <p:sp>
-        <p:nvSpPr>
-          <p:cNvPr id="170" name="CustomShape 39"/>
-          <p:cNvSpPr/>
-          <p:nvPr/>
-        </p:nvSpPr>
-        <p:spPr>
-          <a:xfrm>
-            <a:off x="5343120" y="3382920"/>
-            <a:ext cx="1553400" cy="360"/>
+          <p:cNvPr id="166" name="CustomShape 35"/>
+          <p:cNvSpPr/>
+          <p:nvPr/>
+        </p:nvSpPr>
+        <p:spPr>
+          <a:xfrm>
+            <a:off x="5356440" y="3499200"/>
+            <a:ext cx="1598760" cy="360"/>
           </a:xfrm>
           <a:custGeom>
             <a:avLst/>
@@ -8063,64 +7856,12 @@
           <a:noFill/>
           <a:ln w="19080">
             <a:solidFill>
-              <a:srgbClr val="7030a0"/>
-            </a:solidFill>
-            <a:round/>
-            <a:tailEnd len="med" type="triangle" w="med"/>
-          </a:ln>
-        </p:spPr>
-        <p:style>
-          <a:lnRef idx="1">
-            <a:schemeClr val="accent1"/>
-          </a:lnRef>
-          <a:fillRef idx="0">
-            <a:schemeClr val="accent1"/>
-          </a:fillRef>
-          <a:effectRef idx="0">
-            <a:schemeClr val="accent1"/>
-          </a:effectRef>
-          <a:fontRef idx="minor"/>
-        </p:style>
-      </p:sp>
-      <p:sp>
-        <p:nvSpPr>
-          <p:cNvPr id="171" name="CustomShape 40"/>
-          <p:cNvSpPr/>
-          <p:nvPr/>
-        </p:nvSpPr>
-        <p:spPr>
-          <a:xfrm>
-            <a:off x="5342400" y="3671280"/>
-            <a:ext cx="1544400" cy="360"/>
-          </a:xfrm>
-          <a:custGeom>
-            <a:avLst/>
-            <a:gdLst/>
-            <a:ahLst/>
-            <a:rect l="l" t="t" r="r" b="b"/>
-            <a:pathLst>
-              <a:path w="21600" h="21600">
-                <a:moveTo>
-                  <a:pt x="0" y="0"/>
-                </a:moveTo>
-                <a:lnTo>
-                  <a:pt x="21600" y="21600"/>
-                </a:lnTo>
-              </a:path>
-            </a:pathLst>
-          </a:custGeom>
-          <a:noFill/>
-          <a:ln w="19080">
-            <a:solidFill>
               <a:schemeClr val="accent5">
                 <a:lumMod val="75000"/>
               </a:schemeClr>
             </a:solidFill>
-            <a:custDash>
-              <a:ds d="300000" sp="100000"/>
-            </a:custDash>
-            <a:round/>
-            <a:headEnd len="med" type="triangle" w="med"/>
+            <a:round/>
+            <a:tailEnd len="med" type="triangle" w="med"/>
           </a:ln>
         </p:spPr>
         <p:style>
@@ -8138,65 +7879,14 @@
       </p:sp>
       <p:sp>
         <p:nvSpPr>
-          <p:cNvPr id="172" name="CustomShape 41"/>
-          <p:cNvSpPr/>
-          <p:nvPr/>
-        </p:nvSpPr>
-        <p:spPr>
-          <a:xfrm>
-            <a:off x="6996600" y="3407760"/>
-            <a:ext cx="1599120" cy="360"/>
-          </a:xfrm>
-          <a:custGeom>
-            <a:avLst/>
-            <a:gdLst/>
-            <a:ahLst/>
-            <a:rect l="l" t="t" r="r" b="b"/>
-            <a:pathLst>
-              <a:path w="21600" h="21600">
-                <a:moveTo>
-                  <a:pt x="0" y="0"/>
-                </a:moveTo>
-                <a:lnTo>
-                  <a:pt x="21600" y="21600"/>
-                </a:lnTo>
-              </a:path>
-            </a:pathLst>
-          </a:custGeom>
-          <a:noFill/>
-          <a:ln w="19080">
-            <a:solidFill>
-              <a:schemeClr val="accent5">
-                <a:lumMod val="75000"/>
-              </a:schemeClr>
-            </a:solidFill>
-            <a:round/>
-            <a:tailEnd len="med" type="triangle" w="med"/>
-          </a:ln>
-        </p:spPr>
-        <p:style>
-          <a:lnRef idx="1">
-            <a:schemeClr val="accent1"/>
-          </a:lnRef>
-          <a:fillRef idx="0">
-            <a:schemeClr val="accent1"/>
-          </a:fillRef>
-          <a:effectRef idx="0">
-            <a:schemeClr val="accent1"/>
-          </a:effectRef>
-          <a:fontRef idx="minor"/>
-        </p:style>
-      </p:sp>
-      <p:sp>
-        <p:nvSpPr>
-          <p:cNvPr id="173" name="CustomShape 42"/>
-          <p:cNvSpPr/>
-          <p:nvPr/>
-        </p:nvSpPr>
-        <p:spPr>
-          <a:xfrm>
-            <a:off x="7027200" y="3235680"/>
-            <a:ext cx="1661760" cy="94320"/>
+          <p:cNvPr id="167" name="CustomShape 36"/>
+          <p:cNvSpPr/>
+          <p:nvPr/>
+        </p:nvSpPr>
+        <p:spPr>
+          <a:xfrm>
+            <a:off x="5387040" y="3327120"/>
+            <a:ext cx="1661400" cy="93960"/>
           </a:xfrm>
           <a:prstGeom prst="rect">
             <a:avLst/>
@@ -8238,28 +7928,28 @@
       </p:sp>
       <p:grpSp>
         <p:nvGrpSpPr>
-          <p:cNvPr id="174" name="Group 43"/>
+          <p:cNvPr id="168" name="Group 37"/>
           <p:cNvGrpSpPr/>
           <p:nvPr/>
         </p:nvGrpSpPr>
         <p:grpSpPr>
           <a:xfrm>
-            <a:off x="8662320" y="3423240"/>
-            <a:ext cx="146880" cy="195480"/>
-            <a:chOff x="8662320" y="3423240"/>
-            <a:chExt cx="146880" cy="195480"/>
+            <a:off x="7021800" y="3513960"/>
+            <a:ext cx="146880" cy="195840"/>
+            <a:chOff x="7021800" y="3513960"/>
+            <a:chExt cx="146880" cy="195840"/>
           </a:xfrm>
         </p:grpSpPr>
         <p:sp>
           <p:nvSpPr>
-            <p:cNvPr id="175" name="CustomShape 44"/>
+            <p:cNvPr id="169" name="CustomShape 38"/>
             <p:cNvSpPr/>
             <p:nvPr/>
           </p:nvSpPr>
           <p:spPr>
             <a:xfrm flipV="1" rot="18998400">
-              <a:off x="8695080" y="3448440"/>
-              <a:ext cx="103320" cy="72000"/>
+              <a:off x="7054920" y="3538800"/>
+              <a:ext cx="102960" cy="71640"/>
             </a:xfrm>
             <a:custGeom>
               <a:avLst/>
@@ -8315,14 +8005,14 @@
         </p:sp>
         <p:sp>
           <p:nvSpPr>
-            <p:cNvPr id="176" name="CustomShape 45"/>
+            <p:cNvPr id="170" name="CustomShape 39"/>
             <p:cNvSpPr/>
             <p:nvPr/>
           </p:nvSpPr>
           <p:spPr>
             <a:xfrm flipH="1">
-              <a:off x="8662320" y="3513960"/>
-              <a:ext cx="59760" cy="104760"/>
+              <a:off x="7021440" y="3605400"/>
+              <a:ext cx="59400" cy="104400"/>
             </a:xfrm>
             <a:prstGeom prst="rect">
               <a:avLst/>
@@ -8362,14 +8052,14 @@
       </p:grpSp>
       <p:sp>
         <p:nvSpPr>
-          <p:cNvPr id="177" name="CustomShape 46"/>
-          <p:cNvSpPr/>
-          <p:nvPr/>
-        </p:nvSpPr>
-        <p:spPr>
-          <a:xfrm>
-            <a:off x="8843400" y="3354480"/>
-            <a:ext cx="335520" cy="265320"/>
+          <p:cNvPr id="171" name="CustomShape 40"/>
+          <p:cNvSpPr/>
+          <p:nvPr/>
+        </p:nvSpPr>
+        <p:spPr>
+          <a:xfrm>
+            <a:off x="7223760" y="3301200"/>
+            <a:ext cx="335160" cy="264960"/>
           </a:xfrm>
           <a:prstGeom prst="rect">
             <a:avLst/>
@@ -8471,14 +8161,14 @@
       </p:grpSpPr>
       <p:sp>
         <p:nvSpPr>
-          <p:cNvPr id="178" name="CustomShape 1"/>
+          <p:cNvPr id="172" name="CustomShape 1"/>
           <p:cNvSpPr/>
           <p:nvPr/>
         </p:nvSpPr>
         <p:spPr>
           <a:xfrm>
             <a:off x="3044520" y="2997360"/>
-            <a:ext cx="3155400" cy="344520"/>
+            <a:ext cx="3155040" cy="344160"/>
           </a:xfrm>
           <a:prstGeom prst="rect">
             <a:avLst/>
@@ -8530,7 +8220,7 @@
       </p:sp>
       <p:sp>
         <p:nvSpPr>
-          <p:cNvPr id="179" name="Line 2"/>
+          <p:cNvPr id="173" name="Line 2"/>
           <p:cNvSpPr/>
           <p:nvPr/>
         </p:nvSpPr>
@@ -8566,14 +8256,14 @@
       </p:sp>
       <p:sp>
         <p:nvSpPr>
-          <p:cNvPr id="180" name="CustomShape 3"/>
+          <p:cNvPr id="174" name="CustomShape 3"/>
           <p:cNvSpPr/>
           <p:nvPr/>
         </p:nvSpPr>
         <p:spPr>
           <a:xfrm>
             <a:off x="4509360" y="2677680"/>
-            <a:ext cx="211320" cy="154080"/>
+            <a:ext cx="210960" cy="153720"/>
           </a:xfrm>
           <a:prstGeom prst="triangle">
             <a:avLst>
@@ -8604,14 +8294,14 @@
       </p:sp>
       <p:sp>
         <p:nvSpPr>
-          <p:cNvPr id="181" name="CustomShape 4"/>
+          <p:cNvPr id="175" name="CustomShape 4"/>
           <p:cNvSpPr/>
           <p:nvPr/>
         </p:nvSpPr>
         <p:spPr>
           <a:xfrm>
             <a:off x="4020840" y="2307600"/>
-            <a:ext cx="1189800" cy="344520"/>
+            <a:ext cx="1189440" cy="344160"/>
           </a:xfrm>
           <a:prstGeom prst="rect">
             <a:avLst/>
@@ -8663,14 +8353,14 @@
       </p:sp>
       <p:sp>
         <p:nvSpPr>
-          <p:cNvPr id="182" name="CustomShape 5"/>
+          <p:cNvPr id="176" name="CustomShape 5"/>
           <p:cNvSpPr/>
           <p:nvPr/>
         </p:nvSpPr>
         <p:spPr>
           <a:xfrm>
             <a:off x="4141800" y="3738960"/>
-            <a:ext cx="942840" cy="344520"/>
+            <a:ext cx="942480" cy="344160"/>
           </a:xfrm>
           <a:prstGeom prst="rect">
             <a:avLst/>
@@ -8722,14 +8412,14 @@
       </p:sp>
       <p:sp>
         <p:nvSpPr>
-          <p:cNvPr id="183" name="CustomShape 6"/>
+          <p:cNvPr id="177" name="CustomShape 6"/>
           <p:cNvSpPr/>
           <p:nvPr/>
         </p:nvSpPr>
         <p:spPr>
           <a:xfrm>
             <a:off x="4540680" y="3372480"/>
-            <a:ext cx="144720" cy="184680"/>
+            <a:ext cx="144360" cy="184320"/>
           </a:xfrm>
           <a:prstGeom prst="diamond">
             <a:avLst/>
@@ -8758,7 +8448,7 @@
       </p:sp>
       <p:sp>
         <p:nvSpPr>
-          <p:cNvPr id="184" name="Line 7"/>
+          <p:cNvPr id="178" name="Line 7"/>
           <p:cNvSpPr/>
           <p:nvPr/>
         </p:nvSpPr>
@@ -8794,14 +8484,14 @@
       </p:sp>
       <p:sp>
         <p:nvSpPr>
-          <p:cNvPr id="185" name="CustomShape 8"/>
+          <p:cNvPr id="179" name="CustomShape 8"/>
           <p:cNvSpPr/>
           <p:nvPr/>
         </p:nvSpPr>
         <p:spPr>
           <a:xfrm>
             <a:off x="4399560" y="3537720"/>
-            <a:ext cx="217440" cy="301680"/>
+            <a:ext cx="217080" cy="301320"/>
           </a:xfrm>
           <a:prstGeom prst="rect">
             <a:avLst/>
@@ -8892,14 +8582,14 @@
       </p:grpSpPr>
       <p:sp>
         <p:nvSpPr>
-          <p:cNvPr id="186" name="CustomShape 1"/>
+          <p:cNvPr id="180" name="CustomShape 1"/>
           <p:cNvSpPr/>
           <p:nvPr/>
         </p:nvSpPr>
         <p:spPr>
           <a:xfrm>
             <a:off x="1653120" y="1257840"/>
-            <a:ext cx="5682960" cy="4318200"/>
+            <a:ext cx="5682600" cy="4317840"/>
           </a:xfrm>
           <a:prstGeom prst="roundRect">
             <a:avLst>
@@ -8961,14 +8651,14 @@
       </p:sp>
       <p:sp>
         <p:nvSpPr>
-          <p:cNvPr id="187" name="CustomShape 2"/>
+          <p:cNvPr id="181" name="CustomShape 2"/>
           <p:cNvSpPr/>
           <p:nvPr/>
         </p:nvSpPr>
         <p:spPr>
           <a:xfrm>
             <a:off x="1734480" y="1904400"/>
-            <a:ext cx="1089720" cy="344520"/>
+            <a:ext cx="1089360" cy="344160"/>
           </a:xfrm>
           <a:prstGeom prst="rect">
             <a:avLst/>
@@ -9028,7 +8718,7 @@
       </p:sp>
       <p:sp>
         <p:nvSpPr>
-          <p:cNvPr id="188" name="Line 3"/>
+          <p:cNvPr id="182" name="Line 3"/>
           <p:cNvSpPr/>
           <p:nvPr/>
         </p:nvSpPr>
@@ -9065,14 +8755,14 @@
       </p:sp>
       <p:sp>
         <p:nvSpPr>
-          <p:cNvPr id="189" name="CustomShape 4"/>
+          <p:cNvPr id="183" name="CustomShape 4"/>
           <p:cNvSpPr/>
           <p:nvPr/>
         </p:nvSpPr>
         <p:spPr>
           <a:xfrm>
             <a:off x="2226600" y="2618640"/>
-            <a:ext cx="112320" cy="2889360"/>
+            <a:ext cx="111960" cy="2889000"/>
           </a:xfrm>
           <a:prstGeom prst="rect">
             <a:avLst/>
@@ -9109,14 +8799,14 @@
       </p:sp>
       <p:sp>
         <p:nvSpPr>
-          <p:cNvPr id="190" name="CustomShape 5"/>
+          <p:cNvPr id="184" name="CustomShape 5"/>
           <p:cNvSpPr/>
           <p:nvPr/>
         </p:nvSpPr>
         <p:spPr>
           <a:xfrm>
             <a:off x="3158280" y="1787040"/>
-            <a:ext cx="912600" cy="465480"/>
+            <a:ext cx="912240" cy="465120"/>
           </a:xfrm>
           <a:prstGeom prst="rect">
             <a:avLst/>
@@ -9187,7 +8877,7 @@
       </p:sp>
       <p:sp>
         <p:nvSpPr>
-          <p:cNvPr id="191" name="Line 6"/>
+          <p:cNvPr id="185" name="Line 6"/>
           <p:cNvSpPr/>
           <p:nvPr/>
         </p:nvSpPr>
@@ -9224,14 +8914,14 @@
       </p:sp>
       <p:sp>
         <p:nvSpPr>
-          <p:cNvPr id="192" name="CustomShape 7"/>
+          <p:cNvPr id="186" name="CustomShape 7"/>
           <p:cNvSpPr/>
           <p:nvPr/>
         </p:nvSpPr>
         <p:spPr>
           <a:xfrm>
             <a:off x="3564000" y="2729880"/>
-            <a:ext cx="129600" cy="1127160"/>
+            <a:ext cx="129240" cy="1126800"/>
           </a:xfrm>
           <a:prstGeom prst="rect">
             <a:avLst/>
@@ -9268,14 +8958,14 @@
       </p:sp>
       <p:sp>
         <p:nvSpPr>
-          <p:cNvPr id="193" name="CustomShape 8"/>
+          <p:cNvPr id="187" name="CustomShape 8"/>
           <p:cNvSpPr/>
           <p:nvPr/>
         </p:nvSpPr>
         <p:spPr>
           <a:xfrm>
             <a:off x="5664960" y="2834640"/>
-            <a:ext cx="1084680" cy="469800"/>
+            <a:ext cx="1084320" cy="469440"/>
           </a:xfrm>
           <a:prstGeom prst="rect">
             <a:avLst/>
@@ -9365,7 +9055,7 @@
       </p:sp>
       <p:sp>
         <p:nvSpPr>
-          <p:cNvPr id="194" name="Line 9"/>
+          <p:cNvPr id="188" name="Line 9"/>
           <p:cNvSpPr/>
           <p:nvPr/>
         </p:nvSpPr>
@@ -9402,14 +9092,14 @@
       </p:sp>
       <p:sp>
         <p:nvSpPr>
-          <p:cNvPr id="195" name="CustomShape 10"/>
+          <p:cNvPr id="189" name="CustomShape 10"/>
           <p:cNvSpPr/>
           <p:nvPr/>
         </p:nvSpPr>
         <p:spPr>
           <a:xfrm>
             <a:off x="6123240" y="3310560"/>
-            <a:ext cx="112320" cy="248760"/>
+            <a:ext cx="111960" cy="248400"/>
           </a:xfrm>
           <a:prstGeom prst="rect">
             <a:avLst/>
@@ -9446,14 +9136,14 @@
       </p:sp>
       <p:sp>
         <p:nvSpPr>
-          <p:cNvPr id="196" name="CustomShape 11"/>
+          <p:cNvPr id="190" name="CustomShape 11"/>
           <p:cNvSpPr/>
           <p:nvPr/>
         </p:nvSpPr>
         <p:spPr>
           <a:xfrm>
             <a:off x="1386360" y="2622240"/>
-            <a:ext cx="838080" cy="360"/>
+            <a:ext cx="837720" cy="360"/>
           </a:xfrm>
           <a:custGeom>
             <a:avLst/>
@@ -9495,14 +9185,14 @@
       </p:sp>
       <p:sp>
         <p:nvSpPr>
-          <p:cNvPr id="197" name="CustomShape 12"/>
+          <p:cNvPr id="191" name="CustomShape 12"/>
           <p:cNvSpPr/>
           <p:nvPr/>
         </p:nvSpPr>
         <p:spPr>
           <a:xfrm flipV="1">
-            <a:off x="2340720" y="2725560"/>
-            <a:ext cx="1195560" cy="360"/>
+            <a:off x="2340720" y="2724840"/>
+            <a:ext cx="1195200" cy="360"/>
           </a:xfrm>
           <a:custGeom>
             <a:avLst/>
@@ -9544,14 +9234,14 @@
       </p:sp>
       <p:sp>
         <p:nvSpPr>
-          <p:cNvPr id="198" name="CustomShape 13"/>
+          <p:cNvPr id="192" name="CustomShape 13"/>
           <p:cNvSpPr/>
           <p:nvPr/>
         </p:nvSpPr>
         <p:spPr>
           <a:xfrm flipV="1">
-            <a:off x="5009040" y="3306600"/>
-            <a:ext cx="667080" cy="360"/>
+            <a:off x="5009040" y="3305880"/>
+            <a:ext cx="666720" cy="360"/>
           </a:xfrm>
           <a:custGeom>
             <a:avLst/>
@@ -9593,14 +9283,14 @@
       </p:sp>
       <p:sp>
         <p:nvSpPr>
-          <p:cNvPr id="199" name="CustomShape 14"/>
+          <p:cNvPr id="193" name="CustomShape 14"/>
           <p:cNvSpPr/>
           <p:nvPr/>
         </p:nvSpPr>
         <p:spPr>
           <a:xfrm>
             <a:off x="4124160" y="4092840"/>
-            <a:ext cx="639720" cy="211680"/>
+            <a:ext cx="639360" cy="211320"/>
           </a:xfrm>
           <a:prstGeom prst="rect">
             <a:avLst/>
@@ -9642,14 +9332,14 @@
       </p:sp>
       <p:sp>
         <p:nvSpPr>
-          <p:cNvPr id="200" name="CustomShape 15"/>
+          <p:cNvPr id="194" name="CustomShape 15"/>
           <p:cNvSpPr/>
           <p:nvPr/>
         </p:nvSpPr>
         <p:spPr>
           <a:xfrm>
             <a:off x="5043960" y="3532320"/>
-            <a:ext cx="1117800" cy="360"/>
+            <a:ext cx="1117440" cy="360"/>
           </a:xfrm>
           <a:custGeom>
             <a:avLst/>
@@ -9694,14 +9384,14 @@
       </p:sp>
       <p:sp>
         <p:nvSpPr>
-          <p:cNvPr id="201" name="CustomShape 16"/>
+          <p:cNvPr id="195" name="CustomShape 16"/>
           <p:cNvSpPr/>
           <p:nvPr/>
         </p:nvSpPr>
         <p:spPr>
           <a:xfrm flipV="1">
             <a:off x="2353320" y="3848760"/>
-            <a:ext cx="1195560" cy="3240"/>
+            <a:ext cx="1195200" cy="2880"/>
           </a:xfrm>
           <a:custGeom>
             <a:avLst/>
@@ -9746,14 +9436,14 @@
       </p:sp>
       <p:sp>
         <p:nvSpPr>
-          <p:cNvPr id="202" name="CustomShape 17"/>
+          <p:cNvPr id="196" name="CustomShape 17"/>
           <p:cNvSpPr/>
           <p:nvPr/>
         </p:nvSpPr>
         <p:spPr>
           <a:xfrm>
             <a:off x="7435080" y="1969920"/>
-            <a:ext cx="771120" cy="344520"/>
+            <a:ext cx="770760" cy="344160"/>
           </a:xfrm>
           <a:prstGeom prst="rect">
             <a:avLst/>
@@ -9813,14 +9503,14 @@
       </p:sp>
       <p:sp>
         <p:nvSpPr>
-          <p:cNvPr id="203" name="CustomShape 18"/>
+          <p:cNvPr id="197" name="CustomShape 18"/>
           <p:cNvSpPr/>
           <p:nvPr/>
         </p:nvSpPr>
         <p:spPr>
           <a:xfrm>
             <a:off x="2340720" y="4076280"/>
-            <a:ext cx="3780720" cy="360"/>
+            <a:ext cx="3780360" cy="360"/>
           </a:xfrm>
           <a:custGeom>
             <a:avLst/>
@@ -9862,14 +9552,14 @@
       </p:sp>
       <p:sp>
         <p:nvSpPr>
-          <p:cNvPr id="204" name="CustomShape 19"/>
+          <p:cNvPr id="198" name="CustomShape 19"/>
           <p:cNvSpPr/>
           <p:nvPr/>
         </p:nvSpPr>
         <p:spPr>
           <a:xfrm>
             <a:off x="6116040" y="3661920"/>
-            <a:ext cx="119160" cy="1755720"/>
+            <a:ext cx="118800" cy="1755360"/>
           </a:xfrm>
           <a:prstGeom prst="rect">
             <a:avLst/>
@@ -9906,7 +9596,7 @@
       </p:sp>
       <p:sp>
         <p:nvSpPr>
-          <p:cNvPr id="205" name="Line 20"/>
+          <p:cNvPr id="199" name="Line 20"/>
           <p:cNvSpPr/>
           <p:nvPr/>
         </p:nvSpPr>
@@ -9943,14 +9633,14 @@
       </p:sp>
       <p:sp>
         <p:nvSpPr>
-          <p:cNvPr id="206" name="CustomShape 21"/>
+          <p:cNvPr id="200" name="CustomShape 21"/>
           <p:cNvSpPr/>
           <p:nvPr/>
         </p:nvSpPr>
         <p:spPr>
           <a:xfrm>
             <a:off x="7764480" y="4205160"/>
-            <a:ext cx="112320" cy="219600"/>
+            <a:ext cx="111960" cy="219240"/>
           </a:xfrm>
           <a:prstGeom prst="rect">
             <a:avLst/>
@@ -9987,14 +9677,14 @@
       </p:sp>
       <p:sp>
         <p:nvSpPr>
-          <p:cNvPr id="207" name="CustomShape 22"/>
+          <p:cNvPr id="201" name="CustomShape 22"/>
           <p:cNvSpPr/>
           <p:nvPr/>
         </p:nvSpPr>
         <p:spPr>
           <a:xfrm>
             <a:off x="6238800" y="4516200"/>
-            <a:ext cx="1521360" cy="360"/>
+            <a:ext cx="1521000" cy="360"/>
           </a:xfrm>
           <a:custGeom>
             <a:avLst/>
@@ -10036,14 +9726,14 @@
       </p:sp>
       <p:sp>
         <p:nvSpPr>
-          <p:cNvPr id="208" name="CustomShape 23"/>
+          <p:cNvPr id="202" name="CustomShape 23"/>
           <p:cNvSpPr/>
           <p:nvPr/>
         </p:nvSpPr>
         <p:spPr>
           <a:xfrm>
             <a:off x="2340720" y="5418000"/>
-            <a:ext cx="3787200" cy="360"/>
+            <a:ext cx="3786840" cy="360"/>
           </a:xfrm>
           <a:custGeom>
             <a:avLst/>
@@ -10088,14 +9778,14 @@
       </p:sp>
       <p:sp>
         <p:nvSpPr>
-          <p:cNvPr id="209" name="CustomShape 24"/>
+          <p:cNvPr id="203" name="CustomShape 24"/>
           <p:cNvSpPr/>
           <p:nvPr/>
         </p:nvSpPr>
         <p:spPr>
           <a:xfrm>
             <a:off x="6264000" y="4359960"/>
-            <a:ext cx="1293120" cy="158400"/>
+            <a:ext cx="1292760" cy="158040"/>
           </a:xfrm>
           <a:prstGeom prst="rect">
             <a:avLst/>
@@ -10137,14 +9827,14 @@
       </p:sp>
       <p:sp>
         <p:nvSpPr>
-          <p:cNvPr id="210" name="CustomShape 25"/>
+          <p:cNvPr id="204" name="CustomShape 25"/>
           <p:cNvSpPr/>
           <p:nvPr/>
         </p:nvSpPr>
         <p:spPr>
           <a:xfrm>
             <a:off x="2364480" y="2744640"/>
-            <a:ext cx="1131480" cy="728640"/>
+            <a:ext cx="1131120" cy="728280"/>
           </a:xfrm>
           <a:prstGeom prst="rect">
             <a:avLst/>
@@ -10217,14 +9907,14 @@
       </p:sp>
       <p:sp>
         <p:nvSpPr>
-          <p:cNvPr id="211" name="CustomShape 26"/>
+          <p:cNvPr id="205" name="CustomShape 26"/>
           <p:cNvSpPr/>
           <p:nvPr/>
         </p:nvSpPr>
         <p:spPr>
           <a:xfrm>
             <a:off x="4356000" y="5151240"/>
-            <a:ext cx="464040" cy="211680"/>
+            <a:ext cx="463680" cy="211320"/>
           </a:xfrm>
           <a:prstGeom prst="rect">
             <a:avLst/>
@@ -10266,14 +9956,14 @@
       </p:sp>
       <p:sp>
         <p:nvSpPr>
-          <p:cNvPr id="212" name="CustomShape 27"/>
+          <p:cNvPr id="206" name="CustomShape 27"/>
           <p:cNvSpPr/>
           <p:nvPr/>
         </p:nvSpPr>
         <p:spPr>
           <a:xfrm>
             <a:off x="1550880" y="5146200"/>
-            <a:ext cx="569520" cy="211680"/>
+            <a:ext cx="569160" cy="211320"/>
           </a:xfrm>
           <a:prstGeom prst="rect">
             <a:avLst/>
@@ -10315,14 +10005,14 @@
       </p:sp>
       <p:sp>
         <p:nvSpPr>
-          <p:cNvPr id="213" name="CustomShape 28"/>
+          <p:cNvPr id="207" name="CustomShape 28"/>
           <p:cNvSpPr/>
           <p:nvPr/>
         </p:nvSpPr>
         <p:spPr>
           <a:xfrm>
             <a:off x="6365880" y="4914000"/>
-            <a:ext cx="879120" cy="335880"/>
+            <a:ext cx="878760" cy="335520"/>
           </a:xfrm>
           <a:prstGeom prst="rect">
             <a:avLst/>
@@ -10382,14 +10072,14 @@
       </p:sp>
       <p:sp>
         <p:nvSpPr>
-          <p:cNvPr id="214" name="CustomShape 29"/>
+          <p:cNvPr id="208" name="CustomShape 29"/>
           <p:cNvSpPr/>
           <p:nvPr/>
         </p:nvSpPr>
         <p:spPr>
           <a:xfrm>
             <a:off x="6749640" y="5268600"/>
-            <a:ext cx="112320" cy="91440"/>
+            <a:ext cx="111960" cy="91080"/>
           </a:xfrm>
           <a:prstGeom prst="rect">
             <a:avLst/>
@@ -10426,14 +10116,14 @@
       </p:sp>
       <p:sp>
         <p:nvSpPr>
-          <p:cNvPr id="215" name="CustomShape 30"/>
+          <p:cNvPr id="209" name="CustomShape 30"/>
           <p:cNvSpPr/>
           <p:nvPr/>
         </p:nvSpPr>
         <p:spPr>
           <a:xfrm>
             <a:off x="6249600" y="5354280"/>
-            <a:ext cx="497880" cy="360"/>
+            <a:ext cx="497520" cy="360"/>
           </a:xfrm>
           <a:custGeom>
             <a:avLst/>
@@ -10478,14 +10168,14 @@
       </p:sp>
       <p:sp>
         <p:nvSpPr>
-          <p:cNvPr id="216" name="CustomShape 31"/>
+          <p:cNvPr id="210" name="CustomShape 31"/>
           <p:cNvSpPr/>
           <p:nvPr/>
         </p:nvSpPr>
         <p:spPr>
           <a:xfrm>
             <a:off x="4274640" y="2455920"/>
-            <a:ext cx="1331640" cy="494640"/>
+            <a:ext cx="1331280" cy="494280"/>
           </a:xfrm>
           <a:prstGeom prst="rect">
             <a:avLst/>
@@ -10585,14 +10275,14 @@
       </p:sp>
       <p:sp>
         <p:nvSpPr>
-          <p:cNvPr id="217" name="CustomShape 32"/>
+          <p:cNvPr id="211" name="CustomShape 32"/>
           <p:cNvSpPr/>
           <p:nvPr/>
         </p:nvSpPr>
         <p:spPr>
           <a:xfrm>
             <a:off x="3697560" y="3301200"/>
-            <a:ext cx="1196280" cy="360"/>
+            <a:ext cx="1195920" cy="360"/>
           </a:xfrm>
           <a:custGeom>
             <a:avLst/>
@@ -10634,14 +10324,14 @@
       </p:sp>
       <p:sp>
         <p:nvSpPr>
-          <p:cNvPr id="218" name="CustomShape 33"/>
+          <p:cNvPr id="212" name="CustomShape 33"/>
           <p:cNvSpPr/>
           <p:nvPr/>
         </p:nvSpPr>
         <p:spPr>
           <a:xfrm>
             <a:off x="4895640" y="2960640"/>
-            <a:ext cx="152640" cy="120960"/>
+            <a:ext cx="152280" cy="120600"/>
           </a:xfrm>
           <a:prstGeom prst="rect">
             <a:avLst/>
@@ -10678,7 +10368,7 @@
       </p:sp>
       <p:sp>
         <p:nvSpPr>
-          <p:cNvPr id="219" name="Line 34"/>
+          <p:cNvPr id="213" name="Line 34"/>
           <p:cNvSpPr/>
           <p:nvPr/>
         </p:nvSpPr>
@@ -10715,14 +10405,14 @@
       </p:sp>
       <p:sp>
         <p:nvSpPr>
-          <p:cNvPr id="220" name="CustomShape 35"/>
+          <p:cNvPr id="214" name="CustomShape 35"/>
           <p:cNvSpPr/>
           <p:nvPr/>
         </p:nvSpPr>
         <p:spPr>
           <a:xfrm>
             <a:off x="4895640" y="3265200"/>
-            <a:ext cx="152640" cy="531360"/>
+            <a:ext cx="152280" cy="531000"/>
           </a:xfrm>
           <a:prstGeom prst="rect">
             <a:avLst/>
@@ -10759,14 +10449,14 @@
       </p:sp>
       <p:sp>
         <p:nvSpPr>
-          <p:cNvPr id="221" name="CustomShape 36"/>
+          <p:cNvPr id="215" name="CustomShape 36"/>
           <p:cNvSpPr/>
           <p:nvPr/>
         </p:nvSpPr>
         <p:spPr>
           <a:xfrm>
             <a:off x="3725280" y="3792960"/>
-            <a:ext cx="1248480" cy="360"/>
+            <a:ext cx="1248120" cy="360"/>
           </a:xfrm>
           <a:custGeom>
             <a:avLst/>
@@ -10811,14 +10501,14 @@
       </p:sp>
       <p:sp>
         <p:nvSpPr>
-          <p:cNvPr id="222" name="CustomShape 37"/>
+          <p:cNvPr id="216" name="CustomShape 37"/>
           <p:cNvSpPr/>
           <p:nvPr/>
         </p:nvSpPr>
         <p:spPr>
           <a:xfrm>
             <a:off x="6244200" y="5055840"/>
-            <a:ext cx="119880" cy="360"/>
+            <a:ext cx="119520" cy="360"/>
           </a:xfrm>
           <a:custGeom>
             <a:avLst/>
@@ -10860,14 +10550,14 @@
       </p:sp>
       <p:sp>
         <p:nvSpPr>
-          <p:cNvPr id="223" name="CustomShape 38"/>
+          <p:cNvPr id="217" name="CustomShape 38"/>
           <p:cNvSpPr/>
           <p:nvPr/>
         </p:nvSpPr>
         <p:spPr>
           <a:xfrm>
             <a:off x="3660120" y="2780640"/>
-            <a:ext cx="613080" cy="360"/>
+            <a:ext cx="612720" cy="360"/>
           </a:xfrm>
           <a:custGeom>
             <a:avLst/>
@@ -10909,14 +10599,14 @@
       </p:sp>
       <p:sp>
         <p:nvSpPr>
-          <p:cNvPr id="224" name="CustomShape 39"/>
+          <p:cNvPr id="218" name="CustomShape 39"/>
           <p:cNvSpPr/>
           <p:nvPr/>
         </p:nvSpPr>
         <p:spPr>
           <a:xfrm>
             <a:off x="3695400" y="3083760"/>
-            <a:ext cx="1198440" cy="360"/>
+            <a:ext cx="1198080" cy="360"/>
           </a:xfrm>
           <a:custGeom>
             <a:avLst/>
@@ -10961,14 +10651,14 @@
       </p:sp>
       <p:sp>
         <p:nvSpPr>
-          <p:cNvPr id="225" name="CustomShape 40"/>
+          <p:cNvPr id="219" name="CustomShape 40"/>
           <p:cNvSpPr/>
           <p:nvPr/>
         </p:nvSpPr>
         <p:spPr>
           <a:xfrm>
             <a:off x="3438360" y="3313080"/>
-            <a:ext cx="1248840" cy="135720"/>
+            <a:ext cx="1248480" cy="135360"/>
           </a:xfrm>
           <a:prstGeom prst="rect">
             <a:avLst/>
@@ -11010,7 +10700,7 @@
       </p:sp>
       <p:pic>
         <p:nvPicPr>
-          <p:cNvPr id="226" name="Graphic 2" descr=""/>
+          <p:cNvPr id="220" name="Graphic 2" descr=""/>
           <p:cNvPicPr/>
           <p:nvPr/>
         </p:nvPicPr>
@@ -11021,7 +10711,7 @@
         <p:spPr>
           <a:xfrm>
             <a:off x="4887720" y="3873600"/>
-            <a:ext cx="182880" cy="244080"/>
+            <a:ext cx="182520" cy="243720"/>
           </a:xfrm>
           <a:prstGeom prst="rect">
             <a:avLst/>
@@ -11033,14 +10723,14 @@
       </p:pic>
       <p:sp>
         <p:nvSpPr>
-          <p:cNvPr id="227" name="CustomShape 41"/>
+          <p:cNvPr id="221" name="CustomShape 41"/>
           <p:cNvSpPr/>
           <p:nvPr/>
         </p:nvSpPr>
         <p:spPr>
           <a:xfrm>
             <a:off x="6244200" y="4852080"/>
-            <a:ext cx="1521360" cy="360"/>
+            <a:ext cx="1521000" cy="360"/>
           </a:xfrm>
           <a:custGeom>
             <a:avLst/>
@@ -11082,14 +10772,14 @@
       </p:sp>
       <p:sp>
         <p:nvSpPr>
-          <p:cNvPr id="228" name="CustomShape 42"/>
+          <p:cNvPr id="222" name="CustomShape 42"/>
           <p:cNvSpPr/>
           <p:nvPr/>
         </p:nvSpPr>
         <p:spPr>
           <a:xfrm>
             <a:off x="6183000" y="4658400"/>
-            <a:ext cx="1526040" cy="135720"/>
+            <a:ext cx="1525680" cy="135360"/>
           </a:xfrm>
           <a:prstGeom prst="rect">
             <a:avLst/>
@@ -11131,14 +10821,14 @@
       </p:sp>
       <p:sp>
         <p:nvSpPr>
-          <p:cNvPr id="229" name="CustomShape 43"/>
+          <p:cNvPr id="223" name="CustomShape 43"/>
           <p:cNvSpPr/>
           <p:nvPr/>
         </p:nvSpPr>
         <p:spPr>
           <a:xfrm>
             <a:off x="6240600" y="4228560"/>
-            <a:ext cx="1521360" cy="360"/>
+            <a:ext cx="1521000" cy="360"/>
           </a:xfrm>
           <a:custGeom>
             <a:avLst/>
@@ -11180,14 +10870,14 @@
       </p:sp>
       <p:sp>
         <p:nvSpPr>
-          <p:cNvPr id="230" name="CustomShape 44"/>
+          <p:cNvPr id="224" name="CustomShape 44"/>
           <p:cNvSpPr/>
           <p:nvPr/>
         </p:nvSpPr>
         <p:spPr>
           <a:xfrm>
             <a:off x="6021720" y="4071960"/>
-            <a:ext cx="1293120" cy="158400"/>
+            <a:ext cx="1292760" cy="158040"/>
           </a:xfrm>
           <a:prstGeom prst="rect">
             <a:avLst/>
@@ -11229,14 +10919,14 @@
       </p:sp>
       <p:sp>
         <p:nvSpPr>
-          <p:cNvPr id="231" name="CustomShape 45"/>
+          <p:cNvPr id="225" name="CustomShape 45"/>
           <p:cNvSpPr/>
           <p:nvPr/>
         </p:nvSpPr>
         <p:spPr>
           <a:xfrm>
             <a:off x="7764480" y="4827240"/>
-            <a:ext cx="112320" cy="219600"/>
+            <a:ext cx="111960" cy="219240"/>
           </a:xfrm>
           <a:prstGeom prst="rect">
             <a:avLst/>
@@ -11273,14 +10963,14 @@
       </p:sp>
       <p:sp>
         <p:nvSpPr>
-          <p:cNvPr id="232" name="CustomShape 46"/>
+          <p:cNvPr id="226" name="CustomShape 46"/>
           <p:cNvSpPr/>
           <p:nvPr/>
         </p:nvSpPr>
         <p:spPr>
           <a:xfrm>
             <a:off x="7764480" y="4503240"/>
-            <a:ext cx="112320" cy="219600"/>
+            <a:ext cx="111960" cy="219240"/>
           </a:xfrm>
           <a:prstGeom prst="rect">
             <a:avLst/>
@@ -11317,14 +11007,14 @@
       </p:sp>
       <p:sp>
         <p:nvSpPr>
-          <p:cNvPr id="233" name="CustomShape 47"/>
+          <p:cNvPr id="227" name="CustomShape 47"/>
           <p:cNvSpPr/>
           <p:nvPr/>
         </p:nvSpPr>
         <p:spPr>
           <a:xfrm flipV="1">
             <a:off x="1021320" y="5506560"/>
-            <a:ext cx="1195560" cy="3240"/>
+            <a:ext cx="1195200" cy="2880"/>
           </a:xfrm>
           <a:custGeom>
             <a:avLst/>
@@ -11418,14 +11108,14 @@
       </p:grpSpPr>
       <p:sp>
         <p:nvSpPr>
-          <p:cNvPr id="234" name="CustomShape 1"/>
+          <p:cNvPr id="228" name="CustomShape 1"/>
           <p:cNvSpPr/>
           <p:nvPr/>
         </p:nvSpPr>
         <p:spPr>
           <a:xfrm>
             <a:off x="635760" y="2614680"/>
-            <a:ext cx="682200" cy="215280"/>
+            <a:ext cx="681840" cy="214920"/>
           </a:xfrm>
           <a:prstGeom prst="rect">
             <a:avLst/>
@@ -11485,7 +11175,7 @@
       </p:sp>
       <p:sp>
         <p:nvSpPr>
-          <p:cNvPr id="235" name="Line 2"/>
+          <p:cNvPr id="229" name="Line 2"/>
           <p:cNvSpPr/>
           <p:nvPr/>
         </p:nvSpPr>
@@ -11522,14 +11212,14 @@
       </p:sp>
       <p:sp>
         <p:nvSpPr>
-          <p:cNvPr id="236" name="CustomShape 3"/>
+          <p:cNvPr id="230" name="CustomShape 3"/>
           <p:cNvSpPr/>
           <p:nvPr/>
         </p:nvSpPr>
         <p:spPr>
           <a:xfrm>
             <a:off x="932400" y="3010680"/>
-            <a:ext cx="93600" cy="1033200"/>
+            <a:ext cx="93240" cy="1032840"/>
           </a:xfrm>
           <a:prstGeom prst="rect">
             <a:avLst/>
@@ -11566,28 +11256,28 @@
       </p:sp>
       <p:grpSp>
         <p:nvGrpSpPr>
-          <p:cNvPr id="237" name="Group 4"/>
+          <p:cNvPr id="231" name="Group 4"/>
           <p:cNvGrpSpPr/>
           <p:nvPr/>
         </p:nvGrpSpPr>
         <p:grpSpPr>
           <a:xfrm>
             <a:off x="35640" y="2568240"/>
-            <a:ext cx="202320" cy="357120"/>
+            <a:ext cx="202320" cy="356760"/>
             <a:chOff x="35640" y="2568240"/>
-            <a:chExt cx="202320" cy="357120"/>
+            <a:chExt cx="202320" cy="356760"/>
           </a:xfrm>
         </p:grpSpPr>
         <p:sp>
           <p:nvSpPr>
-            <p:cNvPr id="238" name="CustomShape 5"/>
+            <p:cNvPr id="232" name="CustomShape 5"/>
             <p:cNvSpPr/>
             <p:nvPr/>
           </p:nvSpPr>
           <p:spPr>
             <a:xfrm>
               <a:off x="91800" y="2568240"/>
-              <a:ext cx="88560" cy="88560"/>
+              <a:ext cx="88200" cy="88200"/>
             </a:xfrm>
             <a:prstGeom prst="flowChartConnector">
               <a:avLst/>
@@ -11626,7 +11316,7 @@
         </p:sp>
         <p:sp>
           <p:nvSpPr>
-            <p:cNvPr id="239" name="Line 6"/>
+            <p:cNvPr id="233" name="Line 6"/>
             <p:cNvSpPr/>
             <p:nvPr/>
           </p:nvSpPr>
@@ -11660,14 +11350,14 @@
         </p:sp>
         <p:sp>
           <p:nvSpPr>
-            <p:cNvPr id="240" name="CustomShape 7"/>
+            <p:cNvPr id="234" name="CustomShape 7"/>
             <p:cNvSpPr/>
             <p:nvPr/>
           </p:nvSpPr>
           <p:spPr>
             <a:xfrm>
               <a:off x="61920" y="2813760"/>
-              <a:ext cx="148320" cy="111600"/>
+              <a:ext cx="147960" cy="111240"/>
             </a:xfrm>
             <a:custGeom>
               <a:avLst/>
@@ -11718,7 +11408,7 @@
         </p:sp>
         <p:sp>
           <p:nvSpPr>
-            <p:cNvPr id="241" name="Line 8"/>
+            <p:cNvPr id="235" name="Line 8"/>
             <p:cNvSpPr/>
             <p:nvPr/>
           </p:nvSpPr>
@@ -11753,14 +11443,14 @@
       </p:grpSp>
       <p:sp>
         <p:nvSpPr>
-          <p:cNvPr id="242" name="CustomShape 9"/>
+          <p:cNvPr id="236" name="CustomShape 9"/>
           <p:cNvSpPr/>
           <p:nvPr/>
         </p:nvSpPr>
         <p:spPr>
           <a:xfrm>
             <a:off x="1764000" y="2617200"/>
-            <a:ext cx="682560" cy="215280"/>
+            <a:ext cx="682200" cy="214920"/>
           </a:xfrm>
           <a:prstGeom prst="rect">
             <a:avLst/>
@@ -11820,7 +11510,7 @@
       </p:sp>
       <p:sp>
         <p:nvSpPr>
-          <p:cNvPr id="243" name="Line 10"/>
+          <p:cNvPr id="237" name="Line 10"/>
           <p:cNvSpPr/>
           <p:nvPr/>
         </p:nvSpPr>
@@ -11857,14 +11547,14 @@
       </p:sp>
       <p:sp>
         <p:nvSpPr>
-          <p:cNvPr id="244" name="CustomShape 11"/>
+          <p:cNvPr id="238" name="CustomShape 11"/>
           <p:cNvSpPr/>
           <p:nvPr/>
         </p:nvSpPr>
         <p:spPr>
           <a:xfrm>
             <a:off x="2061000" y="3130560"/>
-            <a:ext cx="88560" cy="850320"/>
+            <a:ext cx="88200" cy="849960"/>
           </a:xfrm>
           <a:prstGeom prst="rect">
             <a:avLst/>
@@ -11901,14 +11591,14 @@
       </p:sp>
       <p:sp>
         <p:nvSpPr>
-          <p:cNvPr id="245" name="CustomShape 12"/>
+          <p:cNvPr id="239" name="CustomShape 12"/>
           <p:cNvSpPr/>
           <p:nvPr/>
         </p:nvSpPr>
         <p:spPr>
           <a:xfrm>
             <a:off x="3265200" y="2614680"/>
-            <a:ext cx="682560" cy="215280"/>
+            <a:ext cx="682200" cy="214920"/>
           </a:xfrm>
           <a:prstGeom prst="rect">
             <a:avLst/>
@@ -11968,7 +11658,7 @@
       </p:sp>
       <p:sp>
         <p:nvSpPr>
-          <p:cNvPr id="246" name="Line 13"/>
+          <p:cNvPr id="240" name="Line 13"/>
           <p:cNvSpPr/>
           <p:nvPr/>
         </p:nvSpPr>
@@ -12005,14 +11695,14 @@
       </p:sp>
       <p:sp>
         <p:nvSpPr>
-          <p:cNvPr id="247" name="CustomShape 14"/>
+          <p:cNvPr id="241" name="CustomShape 14"/>
           <p:cNvSpPr/>
           <p:nvPr/>
         </p:nvSpPr>
         <p:spPr>
           <a:xfrm>
             <a:off x="3562200" y="3172320"/>
-            <a:ext cx="87120" cy="749880"/>
+            <a:ext cx="86760" cy="749520"/>
           </a:xfrm>
           <a:prstGeom prst="rect">
             <a:avLst/>
@@ -12049,14 +11739,14 @@
       </p:sp>
       <p:sp>
         <p:nvSpPr>
-          <p:cNvPr id="248" name="CustomShape 15"/>
+          <p:cNvPr id="242" name="CustomShape 15"/>
           <p:cNvSpPr/>
           <p:nvPr/>
         </p:nvSpPr>
         <p:spPr>
           <a:xfrm>
             <a:off x="232200" y="3063600"/>
-            <a:ext cx="698760" cy="360"/>
+            <a:ext cx="698400" cy="360"/>
           </a:xfrm>
           <a:custGeom>
             <a:avLst/>
@@ -12098,14 +11788,14 @@
       </p:sp>
       <p:sp>
         <p:nvSpPr>
-          <p:cNvPr id="249" name="CustomShape 16"/>
+          <p:cNvPr id="243" name="CustomShape 16"/>
           <p:cNvSpPr/>
           <p:nvPr/>
         </p:nvSpPr>
         <p:spPr>
           <a:xfrm>
             <a:off x="178560" y="3076200"/>
-            <a:ext cx="743760" cy="284760"/>
+            <a:ext cx="743400" cy="284400"/>
           </a:xfrm>
           <a:prstGeom prst="rect">
             <a:avLst/>
@@ -12147,14 +11837,14 @@
       </p:sp>
       <p:sp>
         <p:nvSpPr>
-          <p:cNvPr id="250" name="CustomShape 17"/>
+          <p:cNvPr id="244" name="CustomShape 17"/>
           <p:cNvSpPr/>
           <p:nvPr/>
         </p:nvSpPr>
         <p:spPr>
           <a:xfrm>
             <a:off x="972720" y="3130920"/>
-            <a:ext cx="1081440" cy="360"/>
+            <a:ext cx="1081080" cy="360"/>
           </a:xfrm>
           <a:custGeom>
             <a:avLst/>
@@ -12196,14 +11886,14 @@
       </p:sp>
       <p:sp>
         <p:nvSpPr>
-          <p:cNvPr id="251" name="CustomShape 18"/>
+          <p:cNvPr id="245" name="CustomShape 18"/>
           <p:cNvSpPr/>
           <p:nvPr/>
         </p:nvSpPr>
         <p:spPr>
           <a:xfrm>
             <a:off x="1294920" y="3143520"/>
-            <a:ext cx="889560" cy="93960"/>
+            <a:ext cx="889200" cy="93600"/>
           </a:xfrm>
           <a:prstGeom prst="rect">
             <a:avLst/>
@@ -12245,14 +11935,14 @@
       </p:sp>
       <p:sp>
         <p:nvSpPr>
-          <p:cNvPr id="252" name="CustomShape 19"/>
+          <p:cNvPr id="246" name="CustomShape 19"/>
           <p:cNvSpPr/>
           <p:nvPr/>
         </p:nvSpPr>
         <p:spPr>
           <a:xfrm>
             <a:off x="2116080" y="3187440"/>
-            <a:ext cx="1442880" cy="360"/>
+            <a:ext cx="1442520" cy="360"/>
           </a:xfrm>
           <a:custGeom>
             <a:avLst/>
@@ -12294,14 +11984,14 @@
       </p:sp>
       <p:sp>
         <p:nvSpPr>
-          <p:cNvPr id="253" name="CustomShape 20"/>
+          <p:cNvPr id="247" name="CustomShape 20"/>
           <p:cNvSpPr/>
           <p:nvPr/>
         </p:nvSpPr>
         <p:spPr>
           <a:xfrm>
             <a:off x="2228040" y="3221640"/>
-            <a:ext cx="1245960" cy="75240"/>
+            <a:ext cx="1245600" cy="74880"/>
           </a:xfrm>
           <a:prstGeom prst="rect">
             <a:avLst/>
@@ -12373,14 +12063,14 @@
       </p:sp>
       <p:sp>
         <p:nvSpPr>
-          <p:cNvPr id="254" name="CustomShape 21"/>
+          <p:cNvPr id="248" name="CustomShape 21"/>
           <p:cNvSpPr/>
           <p:nvPr/>
         </p:nvSpPr>
         <p:spPr>
           <a:xfrm>
             <a:off x="3738600" y="3325680"/>
-            <a:ext cx="1523520" cy="94320"/>
+            <a:ext cx="1523160" cy="93960"/>
           </a:xfrm>
           <a:prstGeom prst="rect">
             <a:avLst/>
@@ -12422,14 +12112,14 @@
       </p:sp>
       <p:sp>
         <p:nvSpPr>
-          <p:cNvPr id="255" name="CustomShape 22"/>
+          <p:cNvPr id="249" name="CustomShape 22"/>
           <p:cNvSpPr/>
           <p:nvPr/>
         </p:nvSpPr>
         <p:spPr>
           <a:xfrm>
             <a:off x="2151000" y="3921480"/>
-            <a:ext cx="1442880" cy="360"/>
+            <a:ext cx="1442520" cy="360"/>
           </a:xfrm>
           <a:custGeom>
             <a:avLst/>
@@ -12474,14 +12164,14 @@
       </p:sp>
       <p:sp>
         <p:nvSpPr>
-          <p:cNvPr id="256" name="CustomShape 23"/>
+          <p:cNvPr id="250" name="CustomShape 23"/>
           <p:cNvSpPr/>
           <p:nvPr/>
         </p:nvSpPr>
         <p:spPr>
           <a:xfrm>
             <a:off x="1013040" y="3987360"/>
-            <a:ext cx="1022400" cy="360"/>
+            <a:ext cx="1022040" cy="360"/>
           </a:xfrm>
           <a:custGeom>
             <a:avLst/>
@@ -12526,14 +12216,14 @@
       </p:sp>
       <p:sp>
         <p:nvSpPr>
-          <p:cNvPr id="257" name="CustomShape 24"/>
+          <p:cNvPr id="251" name="CustomShape 24"/>
           <p:cNvSpPr/>
           <p:nvPr/>
         </p:nvSpPr>
         <p:spPr>
           <a:xfrm>
             <a:off x="148680" y="4053960"/>
-            <a:ext cx="777240" cy="360"/>
+            <a:ext cx="776880" cy="360"/>
           </a:xfrm>
           <a:custGeom>
             <a:avLst/>
@@ -12578,14 +12268,14 @@
       </p:sp>
       <p:sp>
         <p:nvSpPr>
-          <p:cNvPr id="258" name="CustomShape 25"/>
+          <p:cNvPr id="252" name="CustomShape 25"/>
           <p:cNvSpPr/>
           <p:nvPr/>
         </p:nvSpPr>
         <p:spPr>
           <a:xfrm>
             <a:off x="4861080" y="2604240"/>
-            <a:ext cx="988200" cy="215280"/>
+            <a:ext cx="987840" cy="214920"/>
           </a:xfrm>
           <a:prstGeom prst="rect">
             <a:avLst/>
@@ -12649,7 +12339,7 @@
       </p:sp>
       <p:sp>
         <p:nvSpPr>
-          <p:cNvPr id="259" name="Line 26"/>
+          <p:cNvPr id="253" name="Line 26"/>
           <p:cNvSpPr/>
           <p:nvPr/>
         </p:nvSpPr>
@@ -12688,14 +12378,14 @@
       </p:sp>
       <p:sp>
         <p:nvSpPr>
-          <p:cNvPr id="260" name="CustomShape 27"/>
+          <p:cNvPr id="254" name="CustomShape 27"/>
           <p:cNvSpPr/>
           <p:nvPr/>
         </p:nvSpPr>
         <p:spPr>
           <a:xfrm>
             <a:off x="5284080" y="3274200"/>
-            <a:ext cx="87120" cy="585360"/>
+            <a:ext cx="86760" cy="585000"/>
           </a:xfrm>
           <a:prstGeom prst="rect">
             <a:avLst/>
@@ -12736,14 +12426,14 @@
       </p:sp>
       <p:sp>
         <p:nvSpPr>
-          <p:cNvPr id="261" name="CustomShape 28"/>
+          <p:cNvPr id="255" name="CustomShape 28"/>
           <p:cNvSpPr/>
           <p:nvPr/>
         </p:nvSpPr>
         <p:spPr>
           <a:xfrm>
             <a:off x="3657240" y="3306960"/>
-            <a:ext cx="1604880" cy="360"/>
+            <a:ext cx="1604520" cy="360"/>
           </a:xfrm>
           <a:custGeom>
             <a:avLst/>
@@ -12785,14 +12475,14 @@
       </p:sp>
       <p:sp>
         <p:nvSpPr>
-          <p:cNvPr id="262" name="CustomShape 29"/>
+          <p:cNvPr id="256" name="CustomShape 29"/>
           <p:cNvSpPr/>
           <p:nvPr/>
         </p:nvSpPr>
         <p:spPr>
           <a:xfrm>
             <a:off x="3657240" y="3854880"/>
-            <a:ext cx="1682640" cy="360"/>
+            <a:ext cx="1682280" cy="360"/>
           </a:xfrm>
           <a:custGeom>
             <a:avLst/>
@@ -12839,7 +12529,7 @@
       </p:sp>
       <p:sp>
         <p:nvSpPr>
-          <p:cNvPr id="263" name="Line 30"/>
+          <p:cNvPr id="257" name="Line 30"/>
           <p:cNvSpPr/>
           <p:nvPr/>
         </p:nvSpPr>
@@ -12876,14 +12566,14 @@
       </p:sp>
       <p:sp>
         <p:nvSpPr>
-          <p:cNvPr id="264" name="CustomShape 31"/>
-          <p:cNvSpPr/>
-          <p:nvPr/>
-        </p:nvSpPr>
-        <p:spPr>
-          <a:xfrm>
-            <a:off x="8394120" y="2751120"/>
-            <a:ext cx="682200" cy="215280"/>
+          <p:cNvPr id="258" name="CustomShape 31"/>
+          <p:cNvSpPr/>
+          <p:nvPr/>
+        </p:nvSpPr>
+        <p:spPr>
+          <a:xfrm>
+            <a:off x="6699600" y="2890440"/>
+            <a:ext cx="681840" cy="214920"/>
           </a:xfrm>
           <a:prstGeom prst="rect">
             <a:avLst/>
@@ -12947,13 +12637,13 @@
       </p:sp>
       <p:sp>
         <p:nvSpPr>
-          <p:cNvPr id="265" name="Line 32"/>
-          <p:cNvSpPr/>
-          <p:nvPr/>
-        </p:nvSpPr>
-        <p:spPr>
-          <a:xfrm>
-            <a:off x="8680320" y="2989440"/>
+          <p:cNvPr id="259" name="Line 32"/>
+          <p:cNvSpPr/>
+          <p:nvPr/>
+        </p:nvSpPr>
+        <p:spPr>
+          <a:xfrm>
+            <a:off x="6985800" y="3128760"/>
             <a:ext cx="360" cy="1077480"/>
           </a:xfrm>
           <a:prstGeom prst="line">
@@ -12986,14 +12676,14 @@
       </p:sp>
       <p:sp>
         <p:nvSpPr>
-          <p:cNvPr id="266" name="CustomShape 33"/>
-          <p:cNvSpPr/>
-          <p:nvPr/>
-        </p:nvSpPr>
-        <p:spPr>
-          <a:xfrm>
-            <a:off x="8635680" y="3423240"/>
-            <a:ext cx="76320" cy="178200"/>
+          <p:cNvPr id="260" name="CustomShape 33"/>
+          <p:cNvSpPr/>
+          <p:nvPr/>
+        </p:nvSpPr>
+        <p:spPr>
+          <a:xfrm>
+            <a:off x="6941160" y="3562560"/>
+            <a:ext cx="75960" cy="177840"/>
           </a:xfrm>
           <a:prstGeom prst="rect">
             <a:avLst/>
@@ -13034,63 +12724,14 @@
       </p:sp>
       <p:sp>
         <p:nvSpPr>
-          <p:cNvPr id="267" name="CustomShape 34"/>
-          <p:cNvSpPr/>
-          <p:nvPr/>
-        </p:nvSpPr>
-        <p:spPr>
-          <a:xfrm>
-            <a:off x="5415480" y="3257280"/>
-            <a:ext cx="1565280" cy="93960"/>
-          </a:xfrm>
-          <a:prstGeom prst="rect">
-            <a:avLst/>
-          </a:prstGeom>
-          <a:noFill/>
-          <a:ln>
-            <a:noFill/>
-          </a:ln>
-        </p:spPr>
-        <p:style>
-          <a:lnRef idx="0"/>
-          <a:fillRef idx="0"/>
-          <a:effectRef idx="0"/>
-          <a:fontRef idx="minor"/>
-        </p:style>
-        <p:txBody>
-          <a:bodyPr lIns="0" rIns="0" tIns="0" bIns="0"/>
-          <a:p>
-            <a:pPr>
-              <a:lnSpc>
-                <a:spcPct val="100000"/>
-              </a:lnSpc>
-            </a:pPr>
-            <a:r>
-              <a:rPr b="0" lang="en-US" sz="700" spc="-1" strike="noStrike">
-                <a:solidFill>
-                  <a:srgbClr val="31859c"/>
-                </a:solidFill>
-                <a:latin typeface="Calibri"/>
-                <a:ea typeface="DejaVu Sans"/>
-              </a:rPr>
-              <a:t>raise(ModuleListChangedEvent)</a:t>
-            </a:r>
-            <a:endParaRPr b="0" lang="en-US" sz="700" spc="-1" strike="noStrike">
-              <a:latin typeface="Arial"/>
-            </a:endParaRPr>
-          </a:p>
-        </p:txBody>
-      </p:sp>
-      <p:sp>
-        <p:nvSpPr>
-          <p:cNvPr id="268" name="CustomShape 35"/>
+          <p:cNvPr id="261" name="CustomShape 34"/>
           <p:cNvSpPr/>
           <p:nvPr/>
         </p:nvSpPr>
         <p:spPr>
           <a:xfrm flipH="1">
-            <a:off x="7023960" y="3592080"/>
-            <a:ext cx="1599120" cy="360"/>
+            <a:off x="5328720" y="3731400"/>
+            <a:ext cx="1598760" cy="360"/>
           </a:xfrm>
           <a:custGeom>
             <a:avLst/>
@@ -13137,172 +12778,14 @@
       </p:sp>
       <p:sp>
         <p:nvSpPr>
-          <p:cNvPr id="269" name="CustomShape 36"/>
-          <p:cNvSpPr/>
-          <p:nvPr/>
-        </p:nvSpPr>
-        <p:spPr>
-          <a:xfrm>
-            <a:off x="6493320" y="2761920"/>
-            <a:ext cx="1004760" cy="214920"/>
-          </a:xfrm>
-          <a:prstGeom prst="rect">
-            <a:avLst/>
-          </a:prstGeom>
-          <a:solidFill>
-            <a:schemeClr val="accent5">
-              <a:lumMod val="75000"/>
-            </a:schemeClr>
-          </a:solidFill>
-          <a:ln w="19080">
-            <a:solidFill>
-              <a:schemeClr val="accent5">
-                <a:lumMod val="75000"/>
-              </a:schemeClr>
-            </a:solidFill>
-            <a:round/>
-          </a:ln>
-          <a:effectLst>
-            <a:outerShdw blurRad="40000" dir="5400000" dist="20000" rotWithShape="0">
-              <a:srgbClr val="000000">
-                <a:alpha val="38000"/>
-              </a:srgbClr>
-            </a:outerShdw>
-          </a:effectLst>
-        </p:spPr>
-        <p:style>
-          <a:lnRef idx="1">
-            <a:schemeClr val="accent2"/>
-          </a:lnRef>
-          <a:fillRef idx="2">
-            <a:schemeClr val="accent2"/>
-          </a:fillRef>
-          <a:effectRef idx="1">
-            <a:schemeClr val="accent2"/>
-          </a:effectRef>
-          <a:fontRef idx="minor"/>
-        </p:style>
-        <p:txBody>
-          <a:bodyPr lIns="90000" rIns="90000" tIns="45000" bIns="45000" anchor="ctr"/>
-          <a:p>
-            <a:pPr algn="ctr">
-              <a:lnSpc>
-                <a:spcPct val="100000"/>
-              </a:lnSpc>
-            </a:pPr>
-            <a:r>
-              <a:rPr b="0" lang="en-US" sz="900" spc="-1" strike="noStrike">
-                <a:solidFill>
-                  <a:srgbClr val="ffffff"/>
-                </a:solidFill>
-                <a:latin typeface="Calibri"/>
-                <a:ea typeface="DejaVu Sans"/>
-              </a:rPr>
-              <a:t>:EventsCenter</a:t>
-            </a:r>
-            <a:endParaRPr b="0" lang="en-US" sz="900" spc="-1" strike="noStrike">
-              <a:latin typeface="Arial"/>
-            </a:endParaRPr>
-          </a:p>
-        </p:txBody>
-      </p:sp>
-      <p:sp>
-        <p:nvSpPr>
-          <p:cNvPr id="270" name="Line 37"/>
-          <p:cNvSpPr/>
-          <p:nvPr/>
-        </p:nvSpPr>
-        <p:spPr>
-          <a:xfrm>
-            <a:off x="6981840" y="2982240"/>
-            <a:ext cx="360" cy="1077840"/>
-          </a:xfrm>
-          <a:prstGeom prst="line">
-            <a:avLst/>
-          </a:prstGeom>
-          <a:ln w="19080">
-            <a:solidFill>
-              <a:schemeClr val="accent5">
-                <a:lumMod val="75000"/>
-              </a:schemeClr>
-            </a:solidFill>
-            <a:custDash>
-              <a:ds d="300000" sp="100000"/>
-            </a:custDash>
-            <a:round/>
-          </a:ln>
-        </p:spPr>
-        <p:style>
-          <a:lnRef idx="1">
-            <a:schemeClr val="accent1"/>
-          </a:lnRef>
-          <a:fillRef idx="2">
-            <a:schemeClr val="accent1"/>
-          </a:fillRef>
-          <a:effectRef idx="1">
-            <a:schemeClr val="accent1"/>
-          </a:effectRef>
-          <a:fontRef idx="minor"/>
-        </p:style>
-      </p:sp>
-      <p:sp>
-        <p:nvSpPr>
-          <p:cNvPr id="271" name="CustomShape 38"/>
-          <p:cNvSpPr/>
-          <p:nvPr/>
-        </p:nvSpPr>
-        <p:spPr>
-          <a:xfrm>
-            <a:off x="6936840" y="3391200"/>
-            <a:ext cx="87120" cy="365760"/>
-          </a:xfrm>
-          <a:prstGeom prst="rect">
-            <a:avLst/>
-          </a:prstGeom>
-          <a:solidFill>
-            <a:schemeClr val="accent5">
-              <a:lumMod val="75000"/>
-            </a:schemeClr>
-          </a:solidFill>
-          <a:ln>
-            <a:solidFill>
-              <a:schemeClr val="accent5">
-                <a:lumMod val="75000"/>
-              </a:schemeClr>
-            </a:solidFill>
-            <a:round/>
-          </a:ln>
-          <a:effectLst>
-            <a:outerShdw blurRad="40000" dir="5400000" dist="20000" rotWithShape="0">
-              <a:srgbClr val="000000">
-                <a:alpha val="38000"/>
-              </a:srgbClr>
-            </a:outerShdw>
-          </a:effectLst>
-        </p:spPr>
-        <p:style>
-          <a:lnRef idx="1">
-            <a:schemeClr val="accent3"/>
-          </a:lnRef>
-          <a:fillRef idx="2">
-            <a:schemeClr val="accent3"/>
-          </a:fillRef>
-          <a:effectRef idx="1">
-            <a:schemeClr val="accent3"/>
-          </a:effectRef>
-          <a:fontRef idx="minor"/>
-        </p:style>
-      </p:sp>
-      <p:sp>
-        <p:nvSpPr>
-          <p:cNvPr id="272" name="CustomShape 39"/>
-          <p:cNvSpPr/>
-          <p:nvPr/>
-        </p:nvSpPr>
-        <p:spPr>
-          <a:xfrm>
-            <a:off x="5372280" y="3390840"/>
-            <a:ext cx="1553400" cy="360"/>
+          <p:cNvPr id="262" name="CustomShape 35"/>
+          <p:cNvSpPr/>
+          <p:nvPr/>
+        </p:nvSpPr>
+        <p:spPr>
+          <a:xfrm>
+            <a:off x="5331240" y="3555000"/>
+            <a:ext cx="1598760" cy="360"/>
           </a:xfrm>
           <a:custGeom>
             <a:avLst/>
@@ -13323,64 +12806,12 @@
           <a:noFill/>
           <a:ln w="19080">
             <a:solidFill>
-              <a:srgbClr val="7030a0"/>
-            </a:solidFill>
-            <a:round/>
-            <a:tailEnd len="med" type="triangle" w="med"/>
-          </a:ln>
-        </p:spPr>
-        <p:style>
-          <a:lnRef idx="1">
-            <a:schemeClr val="accent1"/>
-          </a:lnRef>
-          <a:fillRef idx="0">
-            <a:schemeClr val="accent1"/>
-          </a:fillRef>
-          <a:effectRef idx="0">
-            <a:schemeClr val="accent1"/>
-          </a:effectRef>
-          <a:fontRef idx="minor"/>
-        </p:style>
-      </p:sp>
-      <p:sp>
-        <p:nvSpPr>
-          <p:cNvPr id="273" name="CustomShape 40"/>
-          <p:cNvSpPr/>
-          <p:nvPr/>
-        </p:nvSpPr>
-        <p:spPr>
-          <a:xfrm>
-            <a:off x="5371560" y="3751200"/>
-            <a:ext cx="1544400" cy="360"/>
-          </a:xfrm>
-          <a:custGeom>
-            <a:avLst/>
-            <a:gdLst/>
-            <a:ahLst/>
-            <a:rect l="l" t="t" r="r" b="b"/>
-            <a:pathLst>
-              <a:path w="21600" h="21600">
-                <a:moveTo>
-                  <a:pt x="0" y="0"/>
-                </a:moveTo>
-                <a:lnTo>
-                  <a:pt x="21600" y="21600"/>
-                </a:lnTo>
-              </a:path>
-            </a:pathLst>
-          </a:custGeom>
-          <a:noFill/>
-          <a:ln w="19080">
-            <a:solidFill>
               <a:schemeClr val="accent5">
                 <a:lumMod val="75000"/>
               </a:schemeClr>
             </a:solidFill>
-            <a:custDash>
-              <a:ds d="300000" sp="100000"/>
-            </a:custDash>
-            <a:round/>
-            <a:headEnd len="med" type="triangle" w="med"/>
+            <a:round/>
+            <a:tailEnd len="med" type="triangle" w="med"/>
           </a:ln>
         </p:spPr>
         <p:style>
@@ -13398,65 +12829,14 @@
       </p:sp>
       <p:sp>
         <p:nvSpPr>
-          <p:cNvPr id="274" name="CustomShape 41"/>
-          <p:cNvSpPr/>
-          <p:nvPr/>
-        </p:nvSpPr>
-        <p:spPr>
-          <a:xfrm>
-            <a:off x="7025760" y="3415680"/>
-            <a:ext cx="1599120" cy="360"/>
-          </a:xfrm>
-          <a:custGeom>
-            <a:avLst/>
-            <a:gdLst/>
-            <a:ahLst/>
-            <a:rect l="l" t="t" r="r" b="b"/>
-            <a:pathLst>
-              <a:path w="21600" h="21600">
-                <a:moveTo>
-                  <a:pt x="0" y="0"/>
-                </a:moveTo>
-                <a:lnTo>
-                  <a:pt x="21600" y="21600"/>
-                </a:lnTo>
-              </a:path>
-            </a:pathLst>
-          </a:custGeom>
-          <a:noFill/>
-          <a:ln w="19080">
-            <a:solidFill>
-              <a:schemeClr val="accent5">
-                <a:lumMod val="75000"/>
-              </a:schemeClr>
-            </a:solidFill>
-            <a:round/>
-            <a:tailEnd len="med" type="triangle" w="med"/>
-          </a:ln>
-        </p:spPr>
-        <p:style>
-          <a:lnRef idx="1">
-            <a:schemeClr val="accent1"/>
-          </a:lnRef>
-          <a:fillRef idx="0">
-            <a:schemeClr val="accent1"/>
-          </a:fillRef>
-          <a:effectRef idx="0">
-            <a:schemeClr val="accent1"/>
-          </a:effectRef>
-          <a:fontRef idx="minor"/>
-        </p:style>
-      </p:sp>
-      <p:sp>
-        <p:nvSpPr>
-          <p:cNvPr id="275" name="CustomShape 42"/>
-          <p:cNvSpPr/>
-          <p:nvPr/>
-        </p:nvSpPr>
-        <p:spPr>
-          <a:xfrm>
-            <a:off x="7056360" y="3243600"/>
-            <a:ext cx="1661760" cy="94320"/>
+          <p:cNvPr id="263" name="CustomShape 36"/>
+          <p:cNvSpPr/>
+          <p:nvPr/>
+        </p:nvSpPr>
+        <p:spPr>
+          <a:xfrm>
+            <a:off x="5433840" y="3382920"/>
+            <a:ext cx="1661400" cy="93960"/>
           </a:xfrm>
           <a:prstGeom prst="rect">
             <a:avLst/>
@@ -13498,28 +12878,28 @@
       </p:sp>
       <p:grpSp>
         <p:nvGrpSpPr>
-          <p:cNvPr id="276" name="Group 43"/>
+          <p:cNvPr id="264" name="Group 37"/>
           <p:cNvGrpSpPr/>
           <p:nvPr/>
         </p:nvGrpSpPr>
         <p:grpSpPr>
           <a:xfrm>
-            <a:off x="8691480" y="3431160"/>
-            <a:ext cx="146880" cy="195480"/>
-            <a:chOff x="8691480" y="3431160"/>
-            <a:chExt cx="146880" cy="195480"/>
+            <a:off x="6996600" y="3569760"/>
+            <a:ext cx="146880" cy="195840"/>
+            <a:chOff x="6996600" y="3569760"/>
+            <a:chExt cx="146880" cy="195840"/>
           </a:xfrm>
         </p:grpSpPr>
         <p:sp>
           <p:nvSpPr>
-            <p:cNvPr id="277" name="CustomShape 44"/>
+            <p:cNvPr id="265" name="CustomShape 38"/>
             <p:cNvSpPr/>
             <p:nvPr/>
           </p:nvSpPr>
           <p:spPr>
             <a:xfrm flipV="1" rot="18998400">
-              <a:off x="8724240" y="3456360"/>
-              <a:ext cx="103320" cy="72000"/>
+              <a:off x="7029720" y="3594600"/>
+              <a:ext cx="102960" cy="71640"/>
             </a:xfrm>
             <a:custGeom>
               <a:avLst/>
@@ -13575,14 +12955,14 @@
         </p:sp>
         <p:sp>
           <p:nvSpPr>
-            <p:cNvPr id="278" name="CustomShape 45"/>
+            <p:cNvPr id="266" name="CustomShape 39"/>
             <p:cNvSpPr/>
             <p:nvPr/>
           </p:nvSpPr>
           <p:spPr>
             <a:xfrm flipH="1">
-              <a:off x="8691480" y="3521880"/>
-              <a:ext cx="59760" cy="104760"/>
+              <a:off x="6996240" y="3661200"/>
+              <a:ext cx="59400" cy="104400"/>
             </a:xfrm>
             <a:prstGeom prst="rect">
               <a:avLst/>
@@ -13622,14 +13002,14 @@
       </p:grpSp>
       <p:sp>
         <p:nvSpPr>
-          <p:cNvPr id="279" name="CustomShape 46"/>
-          <p:cNvSpPr/>
-          <p:nvPr/>
-        </p:nvSpPr>
-        <p:spPr>
-          <a:xfrm>
-            <a:off x="8872560" y="3362400"/>
-            <a:ext cx="335520" cy="265320"/>
+          <p:cNvPr id="267" name="CustomShape 40"/>
+          <p:cNvSpPr/>
+          <p:nvPr/>
+        </p:nvSpPr>
+        <p:spPr>
+          <a:xfrm>
+            <a:off x="7178040" y="3501720"/>
+            <a:ext cx="335160" cy="264960"/>
           </a:xfrm>
           <a:prstGeom prst="rect">
             <a:avLst/>
@@ -13731,14 +13111,14 @@
       </p:grpSpPr>
       <p:sp>
         <p:nvSpPr>
-          <p:cNvPr id="280" name="CustomShape 1"/>
+          <p:cNvPr id="268" name="CustomShape 1"/>
           <p:cNvSpPr/>
           <p:nvPr/>
         </p:nvSpPr>
         <p:spPr>
           <a:xfrm>
             <a:off x="3440520" y="2997360"/>
-            <a:ext cx="2350080" cy="344520"/>
+            <a:ext cx="2349720" cy="344160"/>
           </a:xfrm>
           <a:prstGeom prst="rect">
             <a:avLst/>
@@ -13790,7 +13170,7 @@
       </p:sp>
       <p:sp>
         <p:nvSpPr>
-          <p:cNvPr id="281" name="Line 2"/>
+          <p:cNvPr id="269" name="Line 2"/>
           <p:cNvSpPr/>
           <p:nvPr/>
         </p:nvSpPr>
@@ -13826,14 +13206,14 @@
       </p:sp>
       <p:sp>
         <p:nvSpPr>
-          <p:cNvPr id="282" name="CustomShape 3"/>
+          <p:cNvPr id="270" name="CustomShape 3"/>
           <p:cNvSpPr/>
           <p:nvPr/>
         </p:nvSpPr>
         <p:spPr>
           <a:xfrm>
             <a:off x="4509360" y="2677680"/>
-            <a:ext cx="211320" cy="154080"/>
+            <a:ext cx="210960" cy="153720"/>
           </a:xfrm>
           <a:prstGeom prst="triangle">
             <a:avLst>
@@ -13864,14 +13244,14 @@
       </p:sp>
       <p:sp>
         <p:nvSpPr>
-          <p:cNvPr id="283" name="CustomShape 4"/>
+          <p:cNvPr id="271" name="CustomShape 4"/>
           <p:cNvSpPr/>
           <p:nvPr/>
         </p:nvSpPr>
         <p:spPr>
           <a:xfrm>
             <a:off x="4020840" y="2307600"/>
-            <a:ext cx="1189800" cy="344520"/>
+            <a:ext cx="1189440" cy="344160"/>
           </a:xfrm>
           <a:prstGeom prst="rect">
             <a:avLst/>
@@ -13923,14 +13303,14 @@
       </p:sp>
       <p:sp>
         <p:nvSpPr>
-          <p:cNvPr id="284" name="CustomShape 5"/>
+          <p:cNvPr id="272" name="CustomShape 5"/>
           <p:cNvSpPr/>
           <p:nvPr/>
         </p:nvSpPr>
         <p:spPr>
           <a:xfrm>
             <a:off x="3493800" y="3738960"/>
-            <a:ext cx="942840" cy="344520"/>
+            <a:ext cx="942480" cy="344160"/>
           </a:xfrm>
           <a:prstGeom prst="rect">
             <a:avLst/>
@@ -13982,14 +13362,14 @@
       </p:sp>
       <p:sp>
         <p:nvSpPr>
-          <p:cNvPr id="285" name="CustomShape 6"/>
+          <p:cNvPr id="273" name="CustomShape 6"/>
           <p:cNvSpPr/>
           <p:nvPr/>
         </p:nvSpPr>
         <p:spPr>
           <a:xfrm>
             <a:off x="3892680" y="3352680"/>
-            <a:ext cx="144720" cy="184680"/>
+            <a:ext cx="144360" cy="184320"/>
           </a:xfrm>
           <a:prstGeom prst="diamond">
             <a:avLst/>
@@ -14018,7 +13398,7 @@
       </p:sp>
       <p:sp>
         <p:nvSpPr>
-          <p:cNvPr id="286" name="Line 7"/>
+          <p:cNvPr id="274" name="Line 7"/>
           <p:cNvSpPr/>
           <p:nvPr/>
         </p:nvSpPr>
@@ -14054,14 +13434,14 @@
       </p:sp>
       <p:sp>
         <p:nvSpPr>
-          <p:cNvPr id="287" name="CustomShape 8"/>
+          <p:cNvPr id="275" name="CustomShape 8"/>
           <p:cNvSpPr/>
           <p:nvPr/>
         </p:nvSpPr>
         <p:spPr>
           <a:xfrm>
             <a:off x="3751560" y="3537720"/>
-            <a:ext cx="217440" cy="301680"/>
+            <a:ext cx="217080" cy="301320"/>
           </a:xfrm>
           <a:prstGeom prst="rect">
             <a:avLst/>
@@ -14103,14 +13483,14 @@
       </p:sp>
       <p:sp>
         <p:nvSpPr>
-          <p:cNvPr id="288" name="CustomShape 9"/>
+          <p:cNvPr id="276" name="CustomShape 9"/>
           <p:cNvSpPr/>
           <p:nvPr/>
         </p:nvSpPr>
         <p:spPr>
           <a:xfrm>
             <a:off x="4933800" y="3739320"/>
-            <a:ext cx="1009440" cy="344520"/>
+            <a:ext cx="1009080" cy="344160"/>
           </a:xfrm>
           <a:prstGeom prst="rect">
             <a:avLst/>
@@ -14162,14 +13542,14 @@
       </p:sp>
       <p:sp>
         <p:nvSpPr>
-          <p:cNvPr id="289" name="CustomShape 10"/>
+          <p:cNvPr id="277" name="CustomShape 10"/>
           <p:cNvSpPr/>
           <p:nvPr/>
         </p:nvSpPr>
         <p:spPr>
           <a:xfrm>
             <a:off x="5332680" y="3353040"/>
-            <a:ext cx="144720" cy="184680"/>
+            <a:ext cx="144360" cy="184320"/>
           </a:xfrm>
           <a:prstGeom prst="diamond">
             <a:avLst/>
@@ -14198,7 +13578,7 @@
       </p:sp>
       <p:sp>
         <p:nvSpPr>
-          <p:cNvPr id="290" name="Line 11"/>
+          <p:cNvPr id="278" name="Line 11"/>
           <p:cNvSpPr/>
           <p:nvPr/>
         </p:nvSpPr>
@@ -14234,14 +13614,14 @@
       </p:sp>
       <p:sp>
         <p:nvSpPr>
-          <p:cNvPr id="291" name="CustomShape 12"/>
+          <p:cNvPr id="279" name="CustomShape 12"/>
           <p:cNvSpPr/>
           <p:nvPr/>
         </p:nvSpPr>
         <p:spPr>
           <a:xfrm>
             <a:off x="5191560" y="3538080"/>
-            <a:ext cx="217440" cy="301680"/>
+            <a:ext cx="217080" cy="301320"/>
           </a:xfrm>
           <a:prstGeom prst="rect">
             <a:avLst/>
@@ -14332,14 +13712,14 @@
       </p:grpSpPr>
       <p:sp>
         <p:nvSpPr>
-          <p:cNvPr id="292" name="CustomShape 1"/>
+          <p:cNvPr id="280" name="CustomShape 1"/>
           <p:cNvSpPr/>
           <p:nvPr/>
         </p:nvSpPr>
         <p:spPr>
           <a:xfrm>
             <a:off x="635760" y="2614680"/>
-            <a:ext cx="682200" cy="215280"/>
+            <a:ext cx="681840" cy="214920"/>
           </a:xfrm>
           <a:prstGeom prst="rect">
             <a:avLst/>
@@ -14399,7 +13779,7 @@
       </p:sp>
       <p:sp>
         <p:nvSpPr>
-          <p:cNvPr id="293" name="Line 2"/>
+          <p:cNvPr id="281" name="Line 2"/>
           <p:cNvSpPr/>
           <p:nvPr/>
         </p:nvSpPr>
@@ -14436,14 +13816,14 @@
       </p:sp>
       <p:sp>
         <p:nvSpPr>
-          <p:cNvPr id="294" name="CustomShape 3"/>
+          <p:cNvPr id="282" name="CustomShape 3"/>
           <p:cNvSpPr/>
           <p:nvPr/>
         </p:nvSpPr>
         <p:spPr>
           <a:xfrm>
             <a:off x="932400" y="3010680"/>
-            <a:ext cx="93600" cy="1097280"/>
+            <a:ext cx="93240" cy="1096920"/>
           </a:xfrm>
           <a:prstGeom prst="rect">
             <a:avLst/>
@@ -14480,28 +13860,28 @@
       </p:sp>
       <p:grpSp>
         <p:nvGrpSpPr>
-          <p:cNvPr id="295" name="Group 4"/>
+          <p:cNvPr id="283" name="Group 4"/>
           <p:cNvGrpSpPr/>
           <p:nvPr/>
         </p:nvGrpSpPr>
         <p:grpSpPr>
           <a:xfrm>
             <a:off x="35640" y="2568240"/>
-            <a:ext cx="202320" cy="357120"/>
+            <a:ext cx="202320" cy="356760"/>
             <a:chOff x="35640" y="2568240"/>
-            <a:chExt cx="202320" cy="357120"/>
+            <a:chExt cx="202320" cy="356760"/>
           </a:xfrm>
         </p:grpSpPr>
         <p:sp>
           <p:nvSpPr>
-            <p:cNvPr id="296" name="CustomShape 5"/>
+            <p:cNvPr id="284" name="CustomShape 5"/>
             <p:cNvSpPr/>
             <p:nvPr/>
           </p:nvSpPr>
           <p:spPr>
             <a:xfrm>
               <a:off x="91800" y="2568240"/>
-              <a:ext cx="88560" cy="88560"/>
+              <a:ext cx="88200" cy="88200"/>
             </a:xfrm>
             <a:prstGeom prst="flowChartConnector">
               <a:avLst/>
@@ -14540,7 +13920,7 @@
         </p:sp>
         <p:sp>
           <p:nvSpPr>
-            <p:cNvPr id="297" name="Line 6"/>
+            <p:cNvPr id="285" name="Line 6"/>
             <p:cNvSpPr/>
             <p:nvPr/>
           </p:nvSpPr>
@@ -14574,14 +13954,14 @@
         </p:sp>
         <p:sp>
           <p:nvSpPr>
-            <p:cNvPr id="298" name="CustomShape 7"/>
+            <p:cNvPr id="286" name="CustomShape 7"/>
             <p:cNvSpPr/>
             <p:nvPr/>
           </p:nvSpPr>
           <p:spPr>
             <a:xfrm>
               <a:off x="61920" y="2813760"/>
-              <a:ext cx="148320" cy="111600"/>
+              <a:ext cx="147960" cy="111240"/>
             </a:xfrm>
             <a:custGeom>
               <a:avLst/>
@@ -14632,7 +14012,7 @@
         </p:sp>
         <p:sp>
           <p:nvSpPr>
-            <p:cNvPr id="299" name="Line 8"/>
+            <p:cNvPr id="287" name="Line 8"/>
             <p:cNvSpPr/>
             <p:nvPr/>
           </p:nvSpPr>
@@ -14667,14 +14047,14 @@
       </p:grpSp>
       <p:sp>
         <p:nvSpPr>
-          <p:cNvPr id="300" name="CustomShape 9"/>
+          <p:cNvPr id="288" name="CustomShape 9"/>
           <p:cNvSpPr/>
           <p:nvPr/>
         </p:nvSpPr>
         <p:spPr>
           <a:xfrm>
             <a:off x="1764000" y="2617200"/>
-            <a:ext cx="682560" cy="215280"/>
+            <a:ext cx="682200" cy="214920"/>
           </a:xfrm>
           <a:prstGeom prst="rect">
             <a:avLst/>
@@ -14734,7 +14114,7 @@
       </p:sp>
       <p:sp>
         <p:nvSpPr>
-          <p:cNvPr id="301" name="Line 10"/>
+          <p:cNvPr id="289" name="Line 10"/>
           <p:cNvSpPr/>
           <p:nvPr/>
         </p:nvSpPr>
@@ -14771,14 +14151,14 @@
       </p:sp>
       <p:sp>
         <p:nvSpPr>
-          <p:cNvPr id="302" name="CustomShape 11"/>
+          <p:cNvPr id="290" name="CustomShape 11"/>
           <p:cNvSpPr/>
           <p:nvPr/>
         </p:nvSpPr>
         <p:spPr>
           <a:xfrm>
             <a:off x="2061000" y="3130560"/>
-            <a:ext cx="88560" cy="914400"/>
+            <a:ext cx="88200" cy="914040"/>
           </a:xfrm>
           <a:prstGeom prst="rect">
             <a:avLst/>
@@ -14815,14 +14195,14 @@
       </p:sp>
       <p:sp>
         <p:nvSpPr>
-          <p:cNvPr id="303" name="CustomShape 12"/>
+          <p:cNvPr id="291" name="CustomShape 12"/>
           <p:cNvSpPr/>
           <p:nvPr/>
         </p:nvSpPr>
         <p:spPr>
           <a:xfrm>
             <a:off x="3265200" y="2614680"/>
-            <a:ext cx="682560" cy="215280"/>
+            <a:ext cx="682200" cy="214920"/>
           </a:xfrm>
           <a:prstGeom prst="rect">
             <a:avLst/>
@@ -14882,7 +14262,7 @@
       </p:sp>
       <p:sp>
         <p:nvSpPr>
-          <p:cNvPr id="304" name="Line 13"/>
+          <p:cNvPr id="292" name="Line 13"/>
           <p:cNvSpPr/>
           <p:nvPr/>
         </p:nvSpPr>
@@ -14919,14 +14299,14 @@
       </p:sp>
       <p:sp>
         <p:nvSpPr>
-          <p:cNvPr id="305" name="CustomShape 14"/>
+          <p:cNvPr id="293" name="CustomShape 14"/>
           <p:cNvSpPr/>
           <p:nvPr/>
         </p:nvSpPr>
         <p:spPr>
           <a:xfrm>
             <a:off x="3562200" y="3172320"/>
-            <a:ext cx="87120" cy="777240"/>
+            <a:ext cx="86760" cy="776880"/>
           </a:xfrm>
           <a:prstGeom prst="rect">
             <a:avLst/>
@@ -14963,14 +14343,14 @@
       </p:sp>
       <p:sp>
         <p:nvSpPr>
-          <p:cNvPr id="306" name="CustomShape 15"/>
+          <p:cNvPr id="294" name="CustomShape 15"/>
           <p:cNvSpPr/>
           <p:nvPr/>
         </p:nvSpPr>
         <p:spPr>
           <a:xfrm>
             <a:off x="232200" y="3063600"/>
-            <a:ext cx="698760" cy="360"/>
+            <a:ext cx="698400" cy="360"/>
           </a:xfrm>
           <a:custGeom>
             <a:avLst/>
@@ -15012,14 +14392,14 @@
       </p:sp>
       <p:sp>
         <p:nvSpPr>
-          <p:cNvPr id="307" name="CustomShape 16"/>
+          <p:cNvPr id="295" name="CustomShape 16"/>
           <p:cNvSpPr/>
           <p:nvPr/>
         </p:nvSpPr>
         <p:spPr>
           <a:xfrm>
             <a:off x="178560" y="3076200"/>
-            <a:ext cx="743760" cy="284760"/>
+            <a:ext cx="743400" cy="284400"/>
           </a:xfrm>
           <a:prstGeom prst="rect">
             <a:avLst/>
@@ -15061,14 +14441,14 @@
       </p:sp>
       <p:sp>
         <p:nvSpPr>
-          <p:cNvPr id="308" name="CustomShape 17"/>
+          <p:cNvPr id="296" name="CustomShape 17"/>
           <p:cNvSpPr/>
           <p:nvPr/>
         </p:nvSpPr>
         <p:spPr>
           <a:xfrm>
             <a:off x="972720" y="3130920"/>
-            <a:ext cx="1081440" cy="360"/>
+            <a:ext cx="1081080" cy="360"/>
           </a:xfrm>
           <a:custGeom>
             <a:avLst/>
@@ -15110,14 +14490,14 @@
       </p:sp>
       <p:sp>
         <p:nvSpPr>
-          <p:cNvPr id="309" name="CustomShape 18"/>
+          <p:cNvPr id="297" name="CustomShape 18"/>
           <p:cNvSpPr/>
           <p:nvPr/>
         </p:nvSpPr>
         <p:spPr>
           <a:xfrm>
             <a:off x="1294920" y="3143520"/>
-            <a:ext cx="889560" cy="93960"/>
+            <a:ext cx="889200" cy="93600"/>
           </a:xfrm>
           <a:prstGeom prst="rect">
             <a:avLst/>
@@ -15159,14 +14539,14 @@
       </p:sp>
       <p:sp>
         <p:nvSpPr>
-          <p:cNvPr id="310" name="CustomShape 19"/>
+          <p:cNvPr id="298" name="CustomShape 19"/>
           <p:cNvSpPr/>
           <p:nvPr/>
         </p:nvSpPr>
         <p:spPr>
           <a:xfrm>
             <a:off x="2116080" y="3187440"/>
-            <a:ext cx="1442880" cy="360"/>
+            <a:ext cx="1442520" cy="360"/>
           </a:xfrm>
           <a:custGeom>
             <a:avLst/>
@@ -15208,14 +14588,14 @@
       </p:sp>
       <p:sp>
         <p:nvSpPr>
-          <p:cNvPr id="311" name="CustomShape 20"/>
+          <p:cNvPr id="299" name="CustomShape 20"/>
           <p:cNvSpPr/>
           <p:nvPr/>
         </p:nvSpPr>
         <p:spPr>
           <a:xfrm>
             <a:off x="2228040" y="3221640"/>
-            <a:ext cx="1245960" cy="75240"/>
+            <a:ext cx="1245600" cy="74880"/>
           </a:xfrm>
           <a:prstGeom prst="rect">
             <a:avLst/>
@@ -15267,14 +14647,14 @@
       </p:sp>
       <p:sp>
         <p:nvSpPr>
-          <p:cNvPr id="312" name="CustomShape 21"/>
+          <p:cNvPr id="300" name="CustomShape 21"/>
           <p:cNvSpPr/>
           <p:nvPr/>
         </p:nvSpPr>
         <p:spPr>
           <a:xfrm>
             <a:off x="3738600" y="3325680"/>
-            <a:ext cx="1523520" cy="94320"/>
+            <a:ext cx="1523160" cy="93960"/>
           </a:xfrm>
           <a:prstGeom prst="rect">
             <a:avLst/>
@@ -15316,14 +14696,14 @@
       </p:sp>
       <p:sp>
         <p:nvSpPr>
-          <p:cNvPr id="313" name="CustomShape 22"/>
+          <p:cNvPr id="301" name="CustomShape 22"/>
           <p:cNvSpPr/>
           <p:nvPr/>
         </p:nvSpPr>
         <p:spPr>
           <a:xfrm>
             <a:off x="2151000" y="3957480"/>
-            <a:ext cx="1442880" cy="360"/>
+            <a:ext cx="1442520" cy="360"/>
           </a:xfrm>
           <a:custGeom>
             <a:avLst/>
@@ -15368,14 +14748,14 @@
       </p:sp>
       <p:sp>
         <p:nvSpPr>
-          <p:cNvPr id="314" name="CustomShape 23"/>
+          <p:cNvPr id="302" name="CustomShape 23"/>
           <p:cNvSpPr/>
           <p:nvPr/>
         </p:nvSpPr>
         <p:spPr>
           <a:xfrm>
             <a:off x="1013040" y="4059360"/>
-            <a:ext cx="1051560" cy="360"/>
+            <a:ext cx="1051200" cy="360"/>
           </a:xfrm>
           <a:custGeom>
             <a:avLst/>
@@ -15420,14 +14800,14 @@
       </p:sp>
       <p:sp>
         <p:nvSpPr>
-          <p:cNvPr id="315" name="CustomShape 24"/>
+          <p:cNvPr id="303" name="CustomShape 24"/>
           <p:cNvSpPr/>
           <p:nvPr/>
         </p:nvSpPr>
         <p:spPr>
           <a:xfrm>
             <a:off x="184680" y="4125960"/>
-            <a:ext cx="746280" cy="360"/>
+            <a:ext cx="745920" cy="360"/>
           </a:xfrm>
           <a:custGeom>
             <a:avLst/>
@@ -15472,14 +14852,14 @@
       </p:sp>
       <p:sp>
         <p:nvSpPr>
-          <p:cNvPr id="316" name="CustomShape 25"/>
+          <p:cNvPr id="304" name="CustomShape 25"/>
           <p:cNvSpPr/>
           <p:nvPr/>
         </p:nvSpPr>
         <p:spPr>
           <a:xfrm>
             <a:off x="4861080" y="2604240"/>
-            <a:ext cx="988200" cy="215280"/>
+            <a:ext cx="987840" cy="214920"/>
           </a:xfrm>
           <a:prstGeom prst="rect">
             <a:avLst/>
@@ -15543,7 +14923,7 @@
       </p:sp>
       <p:sp>
         <p:nvSpPr>
-          <p:cNvPr id="317" name="Line 26"/>
+          <p:cNvPr id="305" name="Line 26"/>
           <p:cNvSpPr/>
           <p:nvPr/>
         </p:nvSpPr>
@@ -15582,14 +14962,14 @@
       </p:sp>
       <p:sp>
         <p:nvSpPr>
-          <p:cNvPr id="318" name="CustomShape 27"/>
+          <p:cNvPr id="306" name="CustomShape 27"/>
           <p:cNvSpPr/>
           <p:nvPr/>
         </p:nvSpPr>
         <p:spPr>
           <a:xfrm>
             <a:off x="5284080" y="3274200"/>
-            <a:ext cx="87120" cy="612720"/>
+            <a:ext cx="86760" cy="612360"/>
           </a:xfrm>
           <a:prstGeom prst="rect">
             <a:avLst/>
@@ -15630,14 +15010,14 @@
       </p:sp>
       <p:sp>
         <p:nvSpPr>
-          <p:cNvPr id="319" name="CustomShape 28"/>
+          <p:cNvPr id="307" name="CustomShape 28"/>
           <p:cNvSpPr/>
           <p:nvPr/>
         </p:nvSpPr>
         <p:spPr>
           <a:xfrm>
             <a:off x="3657240" y="3306960"/>
-            <a:ext cx="1604880" cy="360"/>
+            <a:ext cx="1604520" cy="360"/>
           </a:xfrm>
           <a:custGeom>
             <a:avLst/>
@@ -15679,14 +15059,14 @@
       </p:sp>
       <p:sp>
         <p:nvSpPr>
-          <p:cNvPr id="320" name="CustomShape 29"/>
+          <p:cNvPr id="308" name="CustomShape 29"/>
           <p:cNvSpPr/>
           <p:nvPr/>
         </p:nvSpPr>
         <p:spPr>
           <a:xfrm>
             <a:off x="3657240" y="3890880"/>
-            <a:ext cx="1627560" cy="360"/>
+            <a:ext cx="1627200" cy="360"/>
           </a:xfrm>
           <a:custGeom>
             <a:avLst/>
@@ -15733,7 +15113,7 @@
       </p:sp>
       <p:sp>
         <p:nvSpPr>
-          <p:cNvPr id="321" name="Line 30"/>
+          <p:cNvPr id="309" name="Line 30"/>
           <p:cNvSpPr/>
           <p:nvPr/>
         </p:nvSpPr>
@@ -15770,14 +15150,14 @@
       </p:sp>
       <p:sp>
         <p:nvSpPr>
-          <p:cNvPr id="322" name="CustomShape 31"/>
-          <p:cNvSpPr/>
-          <p:nvPr/>
-        </p:nvSpPr>
-        <p:spPr>
-          <a:xfrm>
-            <a:off x="8394120" y="2751120"/>
-            <a:ext cx="682200" cy="215280"/>
+          <p:cNvPr id="310" name="CustomShape 31"/>
+          <p:cNvSpPr/>
+          <p:nvPr/>
+        </p:nvSpPr>
+        <p:spPr>
+          <a:xfrm>
+            <a:off x="6699600" y="2890440"/>
+            <a:ext cx="681840" cy="214920"/>
           </a:xfrm>
           <a:prstGeom prst="rect">
             <a:avLst/>
@@ -15841,13 +15221,13 @@
       </p:sp>
       <p:sp>
         <p:nvSpPr>
-          <p:cNvPr id="323" name="Line 32"/>
-          <p:cNvSpPr/>
-          <p:nvPr/>
-        </p:nvSpPr>
-        <p:spPr>
-          <a:xfrm>
-            <a:off x="8680320" y="2989440"/>
+          <p:cNvPr id="311" name="Line 32"/>
+          <p:cNvSpPr/>
+          <p:nvPr/>
+        </p:nvSpPr>
+        <p:spPr>
+          <a:xfrm>
+            <a:off x="6985800" y="3128760"/>
             <a:ext cx="360" cy="1077480"/>
           </a:xfrm>
           <a:prstGeom prst="line">
@@ -15880,14 +15260,14 @@
       </p:sp>
       <p:sp>
         <p:nvSpPr>
-          <p:cNvPr id="324" name="CustomShape 33"/>
-          <p:cNvSpPr/>
-          <p:nvPr/>
-        </p:nvSpPr>
-        <p:spPr>
-          <a:xfrm>
-            <a:off x="8635680" y="3423240"/>
-            <a:ext cx="76320" cy="178200"/>
+          <p:cNvPr id="312" name="CustomShape 33"/>
+          <p:cNvSpPr/>
+          <p:nvPr/>
+        </p:nvSpPr>
+        <p:spPr>
+          <a:xfrm>
+            <a:off x="6941160" y="3562560"/>
+            <a:ext cx="75960" cy="177840"/>
           </a:xfrm>
           <a:prstGeom prst="rect">
             <a:avLst/>
@@ -15928,63 +15308,14 @@
       </p:sp>
       <p:sp>
         <p:nvSpPr>
-          <p:cNvPr id="325" name="CustomShape 34"/>
-          <p:cNvSpPr/>
-          <p:nvPr/>
-        </p:nvSpPr>
-        <p:spPr>
-          <a:xfrm>
-            <a:off x="5415480" y="3257280"/>
-            <a:ext cx="1565280" cy="93960"/>
-          </a:xfrm>
-          <a:prstGeom prst="rect">
-            <a:avLst/>
-          </a:prstGeom>
-          <a:noFill/>
-          <a:ln>
-            <a:noFill/>
-          </a:ln>
-        </p:spPr>
-        <p:style>
-          <a:lnRef idx="0"/>
-          <a:fillRef idx="0"/>
-          <a:effectRef idx="0"/>
-          <a:fontRef idx="minor"/>
-        </p:style>
-        <p:txBody>
-          <a:bodyPr lIns="0" rIns="0" tIns="0" bIns="0"/>
-          <a:p>
-            <a:pPr>
-              <a:lnSpc>
-                <a:spcPct val="100000"/>
-              </a:lnSpc>
-            </a:pPr>
-            <a:r>
-              <a:rPr b="0" lang="en-US" sz="700" spc="-1" strike="noStrike">
-                <a:solidFill>
-                  <a:srgbClr val="31859c"/>
-                </a:solidFill>
-                <a:latin typeface="Calibri"/>
-                <a:ea typeface="DejaVu Sans"/>
-              </a:rPr>
-              <a:t>raise(ModuleListChangedEvent)</a:t>
-            </a:r>
-            <a:endParaRPr b="0" lang="en-US" sz="700" spc="-1" strike="noStrike">
-              <a:latin typeface="Arial"/>
-            </a:endParaRPr>
-          </a:p>
-        </p:txBody>
-      </p:sp>
-      <p:sp>
-        <p:nvSpPr>
-          <p:cNvPr id="326" name="CustomShape 35"/>
+          <p:cNvPr id="313" name="CustomShape 34"/>
           <p:cNvSpPr/>
           <p:nvPr/>
         </p:nvSpPr>
         <p:spPr>
           <a:xfrm flipH="1">
-            <a:off x="7023960" y="3592080"/>
-            <a:ext cx="1599120" cy="360"/>
+            <a:off x="5328720" y="3731400"/>
+            <a:ext cx="1598760" cy="360"/>
           </a:xfrm>
           <a:custGeom>
             <a:avLst/>
@@ -16031,172 +15362,14 @@
       </p:sp>
       <p:sp>
         <p:nvSpPr>
-          <p:cNvPr id="327" name="CustomShape 36"/>
-          <p:cNvSpPr/>
-          <p:nvPr/>
-        </p:nvSpPr>
-        <p:spPr>
-          <a:xfrm>
-            <a:off x="6493320" y="2761920"/>
-            <a:ext cx="1004760" cy="214920"/>
-          </a:xfrm>
-          <a:prstGeom prst="rect">
-            <a:avLst/>
-          </a:prstGeom>
-          <a:solidFill>
-            <a:schemeClr val="accent5">
-              <a:lumMod val="75000"/>
-            </a:schemeClr>
-          </a:solidFill>
-          <a:ln w="19080">
-            <a:solidFill>
-              <a:schemeClr val="accent5">
-                <a:lumMod val="75000"/>
-              </a:schemeClr>
-            </a:solidFill>
-            <a:round/>
-          </a:ln>
-          <a:effectLst>
-            <a:outerShdw blurRad="40000" dir="5400000" dist="20000" rotWithShape="0">
-              <a:srgbClr val="000000">
-                <a:alpha val="38000"/>
-              </a:srgbClr>
-            </a:outerShdw>
-          </a:effectLst>
-        </p:spPr>
-        <p:style>
-          <a:lnRef idx="1">
-            <a:schemeClr val="accent2"/>
-          </a:lnRef>
-          <a:fillRef idx="2">
-            <a:schemeClr val="accent2"/>
-          </a:fillRef>
-          <a:effectRef idx="1">
-            <a:schemeClr val="accent2"/>
-          </a:effectRef>
-          <a:fontRef idx="minor"/>
-        </p:style>
-        <p:txBody>
-          <a:bodyPr lIns="90000" rIns="90000" tIns="45000" bIns="45000" anchor="ctr"/>
-          <a:p>
-            <a:pPr algn="ctr">
-              <a:lnSpc>
-                <a:spcPct val="100000"/>
-              </a:lnSpc>
-            </a:pPr>
-            <a:r>
-              <a:rPr b="0" lang="en-US" sz="900" spc="-1" strike="noStrike">
-                <a:solidFill>
-                  <a:srgbClr val="ffffff"/>
-                </a:solidFill>
-                <a:latin typeface="Calibri"/>
-                <a:ea typeface="DejaVu Sans"/>
-              </a:rPr>
-              <a:t>:EventsCenter</a:t>
-            </a:r>
-            <a:endParaRPr b="0" lang="en-US" sz="900" spc="-1" strike="noStrike">
-              <a:latin typeface="Arial"/>
-            </a:endParaRPr>
-          </a:p>
-        </p:txBody>
-      </p:sp>
-      <p:sp>
-        <p:nvSpPr>
-          <p:cNvPr id="328" name="Line 37"/>
-          <p:cNvSpPr/>
-          <p:nvPr/>
-        </p:nvSpPr>
-        <p:spPr>
-          <a:xfrm>
-            <a:off x="6981840" y="2982240"/>
-            <a:ext cx="360" cy="1077840"/>
-          </a:xfrm>
-          <a:prstGeom prst="line">
-            <a:avLst/>
-          </a:prstGeom>
-          <a:ln w="19080">
-            <a:solidFill>
-              <a:schemeClr val="accent5">
-                <a:lumMod val="75000"/>
-              </a:schemeClr>
-            </a:solidFill>
-            <a:custDash>
-              <a:ds d="300000" sp="100000"/>
-            </a:custDash>
-            <a:round/>
-          </a:ln>
-        </p:spPr>
-        <p:style>
-          <a:lnRef idx="1">
-            <a:schemeClr val="accent1"/>
-          </a:lnRef>
-          <a:fillRef idx="2">
-            <a:schemeClr val="accent1"/>
-          </a:fillRef>
-          <a:effectRef idx="1">
-            <a:schemeClr val="accent1"/>
-          </a:effectRef>
-          <a:fontRef idx="minor"/>
-        </p:style>
-      </p:sp>
-      <p:sp>
-        <p:nvSpPr>
-          <p:cNvPr id="329" name="CustomShape 38"/>
-          <p:cNvSpPr/>
-          <p:nvPr/>
-        </p:nvSpPr>
-        <p:spPr>
-          <a:xfrm>
-            <a:off x="6936840" y="3391200"/>
-            <a:ext cx="87120" cy="438840"/>
-          </a:xfrm>
-          <a:prstGeom prst="rect">
-            <a:avLst/>
-          </a:prstGeom>
-          <a:solidFill>
-            <a:schemeClr val="accent5">
-              <a:lumMod val="75000"/>
-            </a:schemeClr>
-          </a:solidFill>
-          <a:ln>
-            <a:solidFill>
-              <a:schemeClr val="accent5">
-                <a:lumMod val="75000"/>
-              </a:schemeClr>
-            </a:solidFill>
-            <a:round/>
-          </a:ln>
-          <a:effectLst>
-            <a:outerShdw blurRad="40000" dir="5400000" dist="20000" rotWithShape="0">
-              <a:srgbClr val="000000">
-                <a:alpha val="38000"/>
-              </a:srgbClr>
-            </a:outerShdw>
-          </a:effectLst>
-        </p:spPr>
-        <p:style>
-          <a:lnRef idx="1">
-            <a:schemeClr val="accent3"/>
-          </a:lnRef>
-          <a:fillRef idx="2">
-            <a:schemeClr val="accent3"/>
-          </a:fillRef>
-          <a:effectRef idx="1">
-            <a:schemeClr val="accent3"/>
-          </a:effectRef>
-          <a:fontRef idx="minor"/>
-        </p:style>
-      </p:sp>
-      <p:sp>
-        <p:nvSpPr>
-          <p:cNvPr id="330" name="CustomShape 39"/>
-          <p:cNvSpPr/>
-          <p:nvPr/>
-        </p:nvSpPr>
-        <p:spPr>
-          <a:xfrm>
-            <a:off x="5372280" y="3390840"/>
-            <a:ext cx="1553400" cy="360"/>
+          <p:cNvPr id="314" name="CustomShape 35"/>
+          <p:cNvSpPr/>
+          <p:nvPr/>
+        </p:nvSpPr>
+        <p:spPr>
+          <a:xfrm>
+            <a:off x="5331240" y="3555000"/>
+            <a:ext cx="1598760" cy="360"/>
           </a:xfrm>
           <a:custGeom>
             <a:avLst/>
@@ -16217,64 +15390,12 @@
           <a:noFill/>
           <a:ln w="19080">
             <a:solidFill>
-              <a:srgbClr val="7030a0"/>
-            </a:solidFill>
-            <a:round/>
-            <a:tailEnd len="med" type="triangle" w="med"/>
-          </a:ln>
-        </p:spPr>
-        <p:style>
-          <a:lnRef idx="1">
-            <a:schemeClr val="accent1"/>
-          </a:lnRef>
-          <a:fillRef idx="0">
-            <a:schemeClr val="accent1"/>
-          </a:fillRef>
-          <a:effectRef idx="0">
-            <a:schemeClr val="accent1"/>
-          </a:effectRef>
-          <a:fontRef idx="minor"/>
-        </p:style>
-      </p:sp>
-      <p:sp>
-        <p:nvSpPr>
-          <p:cNvPr id="331" name="CustomShape 40"/>
-          <p:cNvSpPr/>
-          <p:nvPr/>
-        </p:nvSpPr>
-        <p:spPr>
-          <a:xfrm>
-            <a:off x="5371560" y="3823200"/>
-            <a:ext cx="1544400" cy="360"/>
-          </a:xfrm>
-          <a:custGeom>
-            <a:avLst/>
-            <a:gdLst/>
-            <a:ahLst/>
-            <a:rect l="l" t="t" r="r" b="b"/>
-            <a:pathLst>
-              <a:path w="21600" h="21600">
-                <a:moveTo>
-                  <a:pt x="0" y="0"/>
-                </a:moveTo>
-                <a:lnTo>
-                  <a:pt x="21600" y="21600"/>
-                </a:lnTo>
-              </a:path>
-            </a:pathLst>
-          </a:custGeom>
-          <a:noFill/>
-          <a:ln w="19080">
-            <a:solidFill>
               <a:schemeClr val="accent5">
                 <a:lumMod val="75000"/>
               </a:schemeClr>
             </a:solidFill>
-            <a:custDash>
-              <a:ds d="300000" sp="100000"/>
-            </a:custDash>
-            <a:round/>
-            <a:headEnd len="med" type="triangle" w="med"/>
+            <a:round/>
+            <a:tailEnd len="med" type="triangle" w="med"/>
           </a:ln>
         </p:spPr>
         <p:style>
@@ -16292,65 +15413,14 @@
       </p:sp>
       <p:sp>
         <p:nvSpPr>
-          <p:cNvPr id="332" name="CustomShape 41"/>
-          <p:cNvSpPr/>
-          <p:nvPr/>
-        </p:nvSpPr>
-        <p:spPr>
-          <a:xfrm>
-            <a:off x="7025760" y="3415680"/>
-            <a:ext cx="1599120" cy="360"/>
-          </a:xfrm>
-          <a:custGeom>
-            <a:avLst/>
-            <a:gdLst/>
-            <a:ahLst/>
-            <a:rect l="l" t="t" r="r" b="b"/>
-            <a:pathLst>
-              <a:path w="21600" h="21600">
-                <a:moveTo>
-                  <a:pt x="0" y="0"/>
-                </a:moveTo>
-                <a:lnTo>
-                  <a:pt x="21600" y="21600"/>
-                </a:lnTo>
-              </a:path>
-            </a:pathLst>
-          </a:custGeom>
-          <a:noFill/>
-          <a:ln w="19080">
-            <a:solidFill>
-              <a:schemeClr val="accent5">
-                <a:lumMod val="75000"/>
-              </a:schemeClr>
-            </a:solidFill>
-            <a:round/>
-            <a:tailEnd len="med" type="triangle" w="med"/>
-          </a:ln>
-        </p:spPr>
-        <p:style>
-          <a:lnRef idx="1">
-            <a:schemeClr val="accent1"/>
-          </a:lnRef>
-          <a:fillRef idx="0">
-            <a:schemeClr val="accent1"/>
-          </a:fillRef>
-          <a:effectRef idx="0">
-            <a:schemeClr val="accent1"/>
-          </a:effectRef>
-          <a:fontRef idx="minor"/>
-        </p:style>
-      </p:sp>
-      <p:sp>
-        <p:nvSpPr>
-          <p:cNvPr id="333" name="CustomShape 42"/>
-          <p:cNvSpPr/>
-          <p:nvPr/>
-        </p:nvSpPr>
-        <p:spPr>
-          <a:xfrm>
-            <a:off x="7056360" y="3243600"/>
-            <a:ext cx="1661760" cy="94320"/>
+          <p:cNvPr id="315" name="CustomShape 36"/>
+          <p:cNvSpPr/>
+          <p:nvPr/>
+        </p:nvSpPr>
+        <p:spPr>
+          <a:xfrm>
+            <a:off x="5397840" y="3382920"/>
+            <a:ext cx="1661400" cy="93960"/>
           </a:xfrm>
           <a:prstGeom prst="rect">
             <a:avLst/>
@@ -16392,28 +15462,28 @@
       </p:sp>
       <p:grpSp>
         <p:nvGrpSpPr>
-          <p:cNvPr id="334" name="Group 43"/>
+          <p:cNvPr id="316" name="Group 37"/>
           <p:cNvGrpSpPr/>
           <p:nvPr/>
         </p:nvGrpSpPr>
         <p:grpSpPr>
           <a:xfrm>
-            <a:off x="8691480" y="3431160"/>
-            <a:ext cx="146880" cy="195480"/>
-            <a:chOff x="8691480" y="3431160"/>
-            <a:chExt cx="146880" cy="195480"/>
+            <a:off x="6996600" y="3569760"/>
+            <a:ext cx="146880" cy="195840"/>
+            <a:chOff x="6996600" y="3569760"/>
+            <a:chExt cx="146880" cy="195840"/>
           </a:xfrm>
         </p:grpSpPr>
         <p:sp>
           <p:nvSpPr>
-            <p:cNvPr id="335" name="CustomShape 44"/>
+            <p:cNvPr id="317" name="CustomShape 38"/>
             <p:cNvSpPr/>
             <p:nvPr/>
           </p:nvSpPr>
           <p:spPr>
             <a:xfrm flipV="1" rot="18998400">
-              <a:off x="8724240" y="3456360"/>
-              <a:ext cx="103320" cy="72000"/>
+              <a:off x="7029720" y="3594600"/>
+              <a:ext cx="102960" cy="71640"/>
             </a:xfrm>
             <a:custGeom>
               <a:avLst/>
@@ -16469,14 +15539,14 @@
         </p:sp>
         <p:sp>
           <p:nvSpPr>
-            <p:cNvPr id="336" name="CustomShape 45"/>
+            <p:cNvPr id="318" name="CustomShape 39"/>
             <p:cNvSpPr/>
             <p:nvPr/>
           </p:nvSpPr>
           <p:spPr>
             <a:xfrm flipH="1">
-              <a:off x="8691480" y="3521880"/>
-              <a:ext cx="59760" cy="104760"/>
+              <a:off x="6996240" y="3661200"/>
+              <a:ext cx="59400" cy="104400"/>
             </a:xfrm>
             <a:prstGeom prst="rect">
               <a:avLst/>
@@ -16516,14 +15586,14 @@
       </p:grpSp>
       <p:sp>
         <p:nvSpPr>
-          <p:cNvPr id="337" name="CustomShape 46"/>
-          <p:cNvSpPr/>
-          <p:nvPr/>
-        </p:nvSpPr>
-        <p:spPr>
-          <a:xfrm>
-            <a:off x="8872560" y="3362400"/>
-            <a:ext cx="335520" cy="265320"/>
+          <p:cNvPr id="319" name="CustomShape 40"/>
+          <p:cNvSpPr/>
+          <p:nvPr/>
+        </p:nvSpPr>
+        <p:spPr>
+          <a:xfrm>
+            <a:off x="7178040" y="3501720"/>
+            <a:ext cx="335160" cy="264960"/>
           </a:xfrm>
           <a:prstGeom prst="rect">
             <a:avLst/>
@@ -16625,14 +15695,14 @@
       </p:grpSpPr>
       <p:sp>
         <p:nvSpPr>
-          <p:cNvPr id="338" name="CustomShape 1"/>
+          <p:cNvPr id="320" name="CustomShape 1"/>
           <p:cNvSpPr/>
           <p:nvPr/>
         </p:nvSpPr>
         <p:spPr>
           <a:xfrm>
             <a:off x="1631880" y="1188720"/>
-            <a:ext cx="5682960" cy="4318200"/>
+            <a:ext cx="5682600" cy="4317840"/>
           </a:xfrm>
           <a:prstGeom prst="roundRect">
             <a:avLst>
@@ -16694,14 +15764,14 @@
       </p:sp>
       <p:sp>
         <p:nvSpPr>
-          <p:cNvPr id="339" name="CustomShape 2"/>
+          <p:cNvPr id="321" name="CustomShape 2"/>
           <p:cNvSpPr/>
           <p:nvPr/>
         </p:nvSpPr>
         <p:spPr>
           <a:xfrm>
             <a:off x="1734480" y="1904400"/>
-            <a:ext cx="1089720" cy="344520"/>
+            <a:ext cx="1089360" cy="344160"/>
           </a:xfrm>
           <a:prstGeom prst="rect">
             <a:avLst/>
@@ -16761,7 +15831,7 @@
       </p:sp>
       <p:sp>
         <p:nvSpPr>
-          <p:cNvPr id="340" name="Line 3"/>
+          <p:cNvPr id="322" name="Line 3"/>
           <p:cNvSpPr/>
           <p:nvPr/>
         </p:nvSpPr>
@@ -16798,14 +15868,14 @@
       </p:sp>
       <p:sp>
         <p:nvSpPr>
-          <p:cNvPr id="341" name="CustomShape 4"/>
+          <p:cNvPr id="323" name="CustomShape 4"/>
           <p:cNvSpPr/>
           <p:nvPr/>
         </p:nvSpPr>
         <p:spPr>
           <a:xfrm>
             <a:off x="2226600" y="2618640"/>
-            <a:ext cx="112320" cy="2871360"/>
+            <a:ext cx="111960" cy="2871000"/>
           </a:xfrm>
           <a:prstGeom prst="rect">
             <a:avLst/>
@@ -16842,14 +15912,14 @@
       </p:sp>
       <p:sp>
         <p:nvSpPr>
-          <p:cNvPr id="342" name="CustomShape 5"/>
+          <p:cNvPr id="324" name="CustomShape 5"/>
           <p:cNvSpPr/>
           <p:nvPr/>
         </p:nvSpPr>
         <p:spPr>
           <a:xfrm>
             <a:off x="3158280" y="1787040"/>
-            <a:ext cx="912600" cy="465480"/>
+            <a:ext cx="912240" cy="465120"/>
           </a:xfrm>
           <a:prstGeom prst="rect">
             <a:avLst/>
@@ -16920,7 +15990,7 @@
       </p:sp>
       <p:sp>
         <p:nvSpPr>
-          <p:cNvPr id="343" name="Line 6"/>
+          <p:cNvPr id="325" name="Line 6"/>
           <p:cNvSpPr/>
           <p:nvPr/>
         </p:nvSpPr>
@@ -16957,14 +16027,14 @@
       </p:sp>
       <p:sp>
         <p:nvSpPr>
-          <p:cNvPr id="344" name="CustomShape 7"/>
+          <p:cNvPr id="326" name="CustomShape 7"/>
           <p:cNvSpPr/>
           <p:nvPr/>
         </p:nvSpPr>
         <p:spPr>
           <a:xfrm>
             <a:off x="3564000" y="2729880"/>
-            <a:ext cx="129600" cy="1127160"/>
+            <a:ext cx="129240" cy="1126800"/>
           </a:xfrm>
           <a:prstGeom prst="rect">
             <a:avLst/>
@@ -17001,14 +16071,14 @@
       </p:sp>
       <p:sp>
         <p:nvSpPr>
-          <p:cNvPr id="345" name="CustomShape 8"/>
+          <p:cNvPr id="327" name="CustomShape 8"/>
           <p:cNvSpPr/>
           <p:nvPr/>
         </p:nvSpPr>
         <p:spPr>
           <a:xfrm>
             <a:off x="5766840" y="2845080"/>
-            <a:ext cx="818280" cy="459360"/>
+            <a:ext cx="817920" cy="459000"/>
           </a:xfrm>
           <a:prstGeom prst="rect">
             <a:avLst/>
@@ -17098,7 +16168,7 @@
       </p:sp>
       <p:sp>
         <p:nvSpPr>
-          <p:cNvPr id="346" name="Line 9"/>
+          <p:cNvPr id="328" name="Line 9"/>
           <p:cNvSpPr/>
           <p:nvPr/>
         </p:nvSpPr>
@@ -17135,14 +16205,14 @@
       </p:sp>
       <p:sp>
         <p:nvSpPr>
-          <p:cNvPr id="347" name="CustomShape 10"/>
+          <p:cNvPr id="329" name="CustomShape 10"/>
           <p:cNvSpPr/>
           <p:nvPr/>
         </p:nvSpPr>
         <p:spPr>
           <a:xfrm>
             <a:off x="6123240" y="3310560"/>
-            <a:ext cx="112320" cy="248760"/>
+            <a:ext cx="111960" cy="248400"/>
           </a:xfrm>
           <a:prstGeom prst="rect">
             <a:avLst/>
@@ -17179,14 +16249,14 @@
       </p:sp>
       <p:sp>
         <p:nvSpPr>
-          <p:cNvPr id="348" name="CustomShape 11"/>
+          <p:cNvPr id="330" name="CustomShape 11"/>
           <p:cNvSpPr/>
           <p:nvPr/>
         </p:nvSpPr>
         <p:spPr>
           <a:xfrm>
             <a:off x="1386360" y="2622240"/>
-            <a:ext cx="838080" cy="360"/>
+            <a:ext cx="837720" cy="360"/>
           </a:xfrm>
           <a:custGeom>
             <a:avLst/>
@@ -17228,14 +16298,14 @@
       </p:sp>
       <p:sp>
         <p:nvSpPr>
-          <p:cNvPr id="349" name="CustomShape 12"/>
+          <p:cNvPr id="331" name="CustomShape 12"/>
           <p:cNvSpPr/>
           <p:nvPr/>
         </p:nvSpPr>
         <p:spPr>
           <a:xfrm flipV="1">
-            <a:off x="2340720" y="2725560"/>
-            <a:ext cx="1195560" cy="360"/>
+            <a:off x="2340720" y="2724840"/>
+            <a:ext cx="1195200" cy="360"/>
           </a:xfrm>
           <a:custGeom>
             <a:avLst/>
@@ -17277,14 +16347,14 @@
       </p:sp>
       <p:sp>
         <p:nvSpPr>
-          <p:cNvPr id="350" name="CustomShape 13"/>
+          <p:cNvPr id="332" name="CustomShape 13"/>
           <p:cNvSpPr/>
           <p:nvPr/>
         </p:nvSpPr>
         <p:spPr>
           <a:xfrm flipV="1">
-            <a:off x="5009040" y="3306600"/>
-            <a:ext cx="758880" cy="360"/>
+            <a:off x="5009040" y="3305880"/>
+            <a:ext cx="758520" cy="360"/>
           </a:xfrm>
           <a:custGeom>
             <a:avLst/>
@@ -17326,14 +16396,14 @@
       </p:sp>
       <p:sp>
         <p:nvSpPr>
-          <p:cNvPr id="351" name="CustomShape 14"/>
+          <p:cNvPr id="333" name="CustomShape 14"/>
           <p:cNvSpPr/>
           <p:nvPr/>
         </p:nvSpPr>
         <p:spPr>
           <a:xfrm>
             <a:off x="4124160" y="4092840"/>
-            <a:ext cx="639720" cy="211680"/>
+            <a:ext cx="639360" cy="211320"/>
           </a:xfrm>
           <a:prstGeom prst="rect">
             <a:avLst/>
@@ -17375,14 +16445,14 @@
       </p:sp>
       <p:sp>
         <p:nvSpPr>
-          <p:cNvPr id="352" name="CustomShape 15"/>
+          <p:cNvPr id="334" name="CustomShape 15"/>
           <p:cNvSpPr/>
           <p:nvPr/>
         </p:nvSpPr>
         <p:spPr>
           <a:xfrm>
             <a:off x="5043960" y="3532320"/>
-            <a:ext cx="1117800" cy="360"/>
+            <a:ext cx="1117440" cy="360"/>
           </a:xfrm>
           <a:custGeom>
             <a:avLst/>
@@ -17427,14 +16497,14 @@
       </p:sp>
       <p:sp>
         <p:nvSpPr>
-          <p:cNvPr id="353" name="CustomShape 16"/>
+          <p:cNvPr id="335" name="CustomShape 16"/>
           <p:cNvSpPr/>
           <p:nvPr/>
         </p:nvSpPr>
         <p:spPr>
           <a:xfrm flipV="1">
             <a:off x="2353320" y="3848760"/>
-            <a:ext cx="1195560" cy="3240"/>
+            <a:ext cx="1195200" cy="2880"/>
           </a:xfrm>
           <a:custGeom>
             <a:avLst/>
@@ -17479,14 +16549,14 @@
       </p:sp>
       <p:sp>
         <p:nvSpPr>
-          <p:cNvPr id="354" name="CustomShape 17"/>
+          <p:cNvPr id="336" name="CustomShape 17"/>
           <p:cNvSpPr/>
           <p:nvPr/>
         </p:nvSpPr>
         <p:spPr>
           <a:xfrm>
             <a:off x="7300080" y="1969920"/>
-            <a:ext cx="771120" cy="344520"/>
+            <a:ext cx="770760" cy="344160"/>
           </a:xfrm>
           <a:prstGeom prst="rect">
             <a:avLst/>
@@ -17546,14 +16616,14 @@
       </p:sp>
       <p:sp>
         <p:nvSpPr>
-          <p:cNvPr id="355" name="CustomShape 18"/>
+          <p:cNvPr id="337" name="CustomShape 18"/>
           <p:cNvSpPr/>
           <p:nvPr/>
         </p:nvSpPr>
         <p:spPr>
           <a:xfrm>
             <a:off x="2340720" y="4076280"/>
-            <a:ext cx="3780720" cy="360"/>
+            <a:ext cx="3780360" cy="360"/>
           </a:xfrm>
           <a:custGeom>
             <a:avLst/>
@@ -17595,14 +16665,14 @@
       </p:sp>
       <p:sp>
         <p:nvSpPr>
-          <p:cNvPr id="356" name="CustomShape 19"/>
+          <p:cNvPr id="338" name="CustomShape 19"/>
           <p:cNvSpPr/>
           <p:nvPr/>
         </p:nvSpPr>
         <p:spPr>
           <a:xfrm>
             <a:off x="6116040" y="3661920"/>
-            <a:ext cx="119160" cy="1755720"/>
+            <a:ext cx="118800" cy="1755360"/>
           </a:xfrm>
           <a:prstGeom prst="rect">
             <a:avLst/>
@@ -17639,7 +16709,7 @@
       </p:sp>
       <p:sp>
         <p:nvSpPr>
-          <p:cNvPr id="357" name="Line 20"/>
+          <p:cNvPr id="339" name="Line 20"/>
           <p:cNvSpPr/>
           <p:nvPr/>
         </p:nvSpPr>
@@ -17676,14 +16746,14 @@
       </p:sp>
       <p:sp>
         <p:nvSpPr>
-          <p:cNvPr id="358" name="CustomShape 21"/>
+          <p:cNvPr id="340" name="CustomShape 21"/>
           <p:cNvSpPr/>
           <p:nvPr/>
         </p:nvSpPr>
         <p:spPr>
           <a:xfrm>
             <a:off x="7629480" y="4241160"/>
-            <a:ext cx="112320" cy="237600"/>
+            <a:ext cx="111960" cy="237240"/>
           </a:xfrm>
           <a:prstGeom prst="rect">
             <a:avLst/>
@@ -17720,14 +16790,14 @@
       </p:sp>
       <p:sp>
         <p:nvSpPr>
-          <p:cNvPr id="359" name="CustomShape 22"/>
+          <p:cNvPr id="341" name="CustomShape 22"/>
           <p:cNvSpPr/>
           <p:nvPr/>
         </p:nvSpPr>
         <p:spPr>
           <a:xfrm>
             <a:off x="2340720" y="5418000"/>
-            <a:ext cx="3787200" cy="360"/>
+            <a:ext cx="3786840" cy="360"/>
           </a:xfrm>
           <a:custGeom>
             <a:avLst/>
@@ -17772,14 +16842,14 @@
       </p:sp>
       <p:sp>
         <p:nvSpPr>
-          <p:cNvPr id="360" name="CustomShape 23"/>
+          <p:cNvPr id="342" name="CustomShape 23"/>
           <p:cNvSpPr/>
           <p:nvPr/>
         </p:nvSpPr>
         <p:spPr>
           <a:xfrm>
             <a:off x="2364480" y="2744640"/>
-            <a:ext cx="1066680" cy="728640"/>
+            <a:ext cx="1066320" cy="728280"/>
           </a:xfrm>
           <a:prstGeom prst="rect">
             <a:avLst/>
@@ -17863,14 +16933,14 @@
       </p:sp>
       <p:sp>
         <p:nvSpPr>
-          <p:cNvPr id="361" name="CustomShape 24"/>
+          <p:cNvPr id="343" name="CustomShape 24"/>
           <p:cNvSpPr/>
           <p:nvPr/>
         </p:nvSpPr>
         <p:spPr>
           <a:xfrm>
             <a:off x="4356000" y="5187240"/>
-            <a:ext cx="464040" cy="211680"/>
+            <a:ext cx="463680" cy="211320"/>
           </a:xfrm>
           <a:prstGeom prst="rect">
             <a:avLst/>
@@ -17912,14 +16982,14 @@
       </p:sp>
       <p:sp>
         <p:nvSpPr>
-          <p:cNvPr id="362" name="CustomShape 25"/>
+          <p:cNvPr id="344" name="CustomShape 25"/>
           <p:cNvSpPr/>
           <p:nvPr/>
         </p:nvSpPr>
         <p:spPr>
           <a:xfrm>
             <a:off x="1550880" y="5146200"/>
-            <a:ext cx="569520" cy="211680"/>
+            <a:ext cx="569160" cy="211320"/>
           </a:xfrm>
           <a:prstGeom prst="rect">
             <a:avLst/>
@@ -17961,14 +17031,14 @@
       </p:sp>
       <p:sp>
         <p:nvSpPr>
-          <p:cNvPr id="363" name="CustomShape 26"/>
+          <p:cNvPr id="345" name="CustomShape 26"/>
           <p:cNvSpPr/>
           <p:nvPr/>
         </p:nvSpPr>
         <p:spPr>
           <a:xfrm>
             <a:off x="6365880" y="4914000"/>
-            <a:ext cx="879120" cy="335880"/>
+            <a:ext cx="878760" cy="335520"/>
           </a:xfrm>
           <a:prstGeom prst="rect">
             <a:avLst/>
@@ -18028,14 +17098,14 @@
       </p:sp>
       <p:sp>
         <p:nvSpPr>
-          <p:cNvPr id="364" name="CustomShape 27"/>
+          <p:cNvPr id="346" name="CustomShape 27"/>
           <p:cNvSpPr/>
           <p:nvPr/>
         </p:nvSpPr>
         <p:spPr>
           <a:xfrm>
             <a:off x="6749640" y="5268600"/>
-            <a:ext cx="112320" cy="91440"/>
+            <a:ext cx="111960" cy="91080"/>
           </a:xfrm>
           <a:prstGeom prst="rect">
             <a:avLst/>
@@ -18072,14 +17142,14 @@
       </p:sp>
       <p:sp>
         <p:nvSpPr>
-          <p:cNvPr id="365" name="CustomShape 28"/>
+          <p:cNvPr id="347" name="CustomShape 28"/>
           <p:cNvSpPr/>
           <p:nvPr/>
         </p:nvSpPr>
         <p:spPr>
           <a:xfrm>
             <a:off x="6249600" y="5354280"/>
-            <a:ext cx="497880" cy="360"/>
+            <a:ext cx="497520" cy="360"/>
           </a:xfrm>
           <a:custGeom>
             <a:avLst/>
@@ -18124,14 +17194,14 @@
       </p:sp>
       <p:sp>
         <p:nvSpPr>
-          <p:cNvPr id="366" name="CustomShape 29"/>
+          <p:cNvPr id="348" name="CustomShape 29"/>
           <p:cNvSpPr/>
           <p:nvPr/>
         </p:nvSpPr>
         <p:spPr>
           <a:xfrm>
             <a:off x="4274640" y="2455920"/>
-            <a:ext cx="1394280" cy="469800"/>
+            <a:ext cx="1393920" cy="469440"/>
           </a:xfrm>
           <a:prstGeom prst="rect">
             <a:avLst/>
@@ -18211,14 +17281,14 @@
       </p:sp>
       <p:sp>
         <p:nvSpPr>
-          <p:cNvPr id="367" name="CustomShape 30"/>
+          <p:cNvPr id="349" name="CustomShape 30"/>
           <p:cNvSpPr/>
           <p:nvPr/>
         </p:nvSpPr>
         <p:spPr>
           <a:xfrm>
             <a:off x="3697560" y="3301200"/>
-            <a:ext cx="1196280" cy="360"/>
+            <a:ext cx="1195920" cy="360"/>
           </a:xfrm>
           <a:custGeom>
             <a:avLst/>
@@ -18260,14 +17330,14 @@
       </p:sp>
       <p:sp>
         <p:nvSpPr>
-          <p:cNvPr id="368" name="CustomShape 31"/>
+          <p:cNvPr id="350" name="CustomShape 31"/>
           <p:cNvSpPr/>
           <p:nvPr/>
         </p:nvSpPr>
         <p:spPr>
           <a:xfrm>
             <a:off x="4895640" y="2960640"/>
-            <a:ext cx="152640" cy="120960"/>
+            <a:ext cx="152280" cy="120600"/>
           </a:xfrm>
           <a:prstGeom prst="rect">
             <a:avLst/>
@@ -18304,7 +17374,7 @@
       </p:sp>
       <p:sp>
         <p:nvSpPr>
-          <p:cNvPr id="369" name="Line 32"/>
+          <p:cNvPr id="351" name="Line 32"/>
           <p:cNvSpPr/>
           <p:nvPr/>
         </p:nvSpPr>
@@ -18341,14 +17411,14 @@
       </p:sp>
       <p:sp>
         <p:nvSpPr>
-          <p:cNvPr id="370" name="CustomShape 33"/>
+          <p:cNvPr id="352" name="CustomShape 33"/>
           <p:cNvSpPr/>
           <p:nvPr/>
         </p:nvSpPr>
         <p:spPr>
           <a:xfrm>
             <a:off x="4895640" y="3265200"/>
-            <a:ext cx="152640" cy="531360"/>
+            <a:ext cx="152280" cy="531000"/>
           </a:xfrm>
           <a:prstGeom prst="rect">
             <a:avLst/>
@@ -18385,14 +17455,14 @@
       </p:sp>
       <p:sp>
         <p:nvSpPr>
-          <p:cNvPr id="371" name="CustomShape 34"/>
+          <p:cNvPr id="353" name="CustomShape 34"/>
           <p:cNvSpPr/>
           <p:nvPr/>
         </p:nvSpPr>
         <p:spPr>
           <a:xfrm>
             <a:off x="3725280" y="3792960"/>
-            <a:ext cx="1248480" cy="360"/>
+            <a:ext cx="1248120" cy="360"/>
           </a:xfrm>
           <a:custGeom>
             <a:avLst/>
@@ -18437,14 +17507,14 @@
       </p:sp>
       <p:sp>
         <p:nvSpPr>
-          <p:cNvPr id="372" name="CustomShape 35"/>
+          <p:cNvPr id="354" name="CustomShape 35"/>
           <p:cNvSpPr/>
           <p:nvPr/>
         </p:nvSpPr>
         <p:spPr>
           <a:xfrm>
             <a:off x="6244200" y="5055840"/>
-            <a:ext cx="119880" cy="360"/>
+            <a:ext cx="119520" cy="360"/>
           </a:xfrm>
           <a:custGeom>
             <a:avLst/>
@@ -18486,14 +17556,14 @@
       </p:sp>
       <p:sp>
         <p:nvSpPr>
-          <p:cNvPr id="373" name="CustomShape 36"/>
+          <p:cNvPr id="355" name="CustomShape 36"/>
           <p:cNvSpPr/>
           <p:nvPr/>
         </p:nvSpPr>
         <p:spPr>
           <a:xfrm>
             <a:off x="3660120" y="2780640"/>
-            <a:ext cx="613080" cy="360"/>
+            <a:ext cx="612720" cy="360"/>
           </a:xfrm>
           <a:custGeom>
             <a:avLst/>
@@ -18535,14 +17605,14 @@
       </p:sp>
       <p:sp>
         <p:nvSpPr>
-          <p:cNvPr id="374" name="CustomShape 37"/>
+          <p:cNvPr id="356" name="CustomShape 37"/>
           <p:cNvSpPr/>
           <p:nvPr/>
         </p:nvSpPr>
         <p:spPr>
           <a:xfrm>
             <a:off x="3695400" y="3083760"/>
-            <a:ext cx="1198440" cy="360"/>
+            <a:ext cx="1198080" cy="360"/>
           </a:xfrm>
           <a:custGeom>
             <a:avLst/>
@@ -18587,14 +17657,14 @@
       </p:sp>
       <p:sp>
         <p:nvSpPr>
-          <p:cNvPr id="375" name="CustomShape 38"/>
+          <p:cNvPr id="357" name="CustomShape 38"/>
           <p:cNvSpPr/>
           <p:nvPr/>
         </p:nvSpPr>
         <p:spPr>
           <a:xfrm>
             <a:off x="3618360" y="3349080"/>
-            <a:ext cx="1248840" cy="135720"/>
+            <a:ext cx="1248480" cy="135360"/>
           </a:xfrm>
           <a:prstGeom prst="rect">
             <a:avLst/>
@@ -18636,7 +17706,7 @@
       </p:sp>
       <p:pic>
         <p:nvPicPr>
-          <p:cNvPr id="376" name="Graphic 2" descr=""/>
+          <p:cNvPr id="358" name="Graphic 2" descr=""/>
           <p:cNvPicPr/>
           <p:nvPr/>
         </p:nvPicPr>
@@ -18647,7 +17717,7 @@
         <p:spPr>
           <a:xfrm>
             <a:off x="4887720" y="3873600"/>
-            <a:ext cx="182880" cy="244080"/>
+            <a:ext cx="182520" cy="243720"/>
           </a:xfrm>
           <a:prstGeom prst="rect">
             <a:avLst/>
@@ -18659,14 +17729,14 @@
       </p:pic>
       <p:sp>
         <p:nvSpPr>
-          <p:cNvPr id="377" name="CustomShape 39"/>
+          <p:cNvPr id="359" name="CustomShape 39"/>
           <p:cNvSpPr/>
           <p:nvPr/>
         </p:nvSpPr>
         <p:spPr>
           <a:xfrm>
             <a:off x="6244200" y="4564080"/>
-            <a:ext cx="1375200" cy="360"/>
+            <a:ext cx="1374840" cy="360"/>
           </a:xfrm>
           <a:custGeom>
             <a:avLst/>
@@ -18708,14 +17778,14 @@
       </p:sp>
       <p:sp>
         <p:nvSpPr>
-          <p:cNvPr id="378" name="CustomShape 40"/>
+          <p:cNvPr id="360" name="CustomShape 40"/>
           <p:cNvSpPr/>
           <p:nvPr/>
         </p:nvSpPr>
         <p:spPr>
           <a:xfrm>
             <a:off x="6309360" y="4406400"/>
-            <a:ext cx="1223640" cy="135720"/>
+            <a:ext cx="1223280" cy="135360"/>
           </a:xfrm>
           <a:prstGeom prst="rect">
             <a:avLst/>
@@ -18757,14 +17827,14 @@
       </p:sp>
       <p:sp>
         <p:nvSpPr>
-          <p:cNvPr id="379" name="CustomShape 41"/>
+          <p:cNvPr id="361" name="CustomShape 41"/>
           <p:cNvSpPr/>
           <p:nvPr/>
         </p:nvSpPr>
         <p:spPr>
           <a:xfrm>
             <a:off x="6238800" y="4264560"/>
-            <a:ext cx="1375200" cy="360"/>
+            <a:ext cx="1374840" cy="360"/>
           </a:xfrm>
           <a:custGeom>
             <a:avLst/>
@@ -18806,14 +17876,14 @@
       </p:sp>
       <p:sp>
         <p:nvSpPr>
-          <p:cNvPr id="380" name="CustomShape 42"/>
+          <p:cNvPr id="362" name="CustomShape 42"/>
           <p:cNvSpPr/>
           <p:nvPr/>
         </p:nvSpPr>
         <p:spPr>
           <a:xfrm>
             <a:off x="6021720" y="4071960"/>
-            <a:ext cx="1293120" cy="158400"/>
+            <a:ext cx="1292760" cy="158040"/>
           </a:xfrm>
           <a:prstGeom prst="rect">
             <a:avLst/>
@@ -18855,14 +17925,14 @@
       </p:sp>
       <p:sp>
         <p:nvSpPr>
-          <p:cNvPr id="381" name="CustomShape 43"/>
+          <p:cNvPr id="363" name="CustomShape 43"/>
           <p:cNvSpPr/>
           <p:nvPr/>
         </p:nvSpPr>
         <p:spPr>
           <a:xfrm>
             <a:off x="7629480" y="4539240"/>
-            <a:ext cx="112320" cy="237600"/>
+            <a:ext cx="111960" cy="237240"/>
           </a:xfrm>
           <a:prstGeom prst="rect">
             <a:avLst/>
@@ -18899,14 +17969,14 @@
       </p:sp>
       <p:sp>
         <p:nvSpPr>
-          <p:cNvPr id="382" name="CustomShape 44"/>
+          <p:cNvPr id="364" name="CustomShape 44"/>
           <p:cNvSpPr/>
           <p:nvPr/>
         </p:nvSpPr>
         <p:spPr>
           <a:xfrm flipV="1">
             <a:off x="1021320" y="5470560"/>
-            <a:ext cx="1195560" cy="3240"/>
+            <a:ext cx="1195200" cy="2880"/>
           </a:xfrm>
           <a:custGeom>
             <a:avLst/>

</xml_diff>